<commit_message>
Additional images for connectivity
</commit_message>
<xml_diff>
--- a/figures/resources/connected_components.pptx
+++ b/figures/resources/connected_components.pptx
@@ -5,10 +5,12 @@
     <p:sldMasterId id="2147483648" r:id="rId1"/>
   </p:sldMasterIdLst>
   <p:notesMasterIdLst>
-    <p:notesMasterId r:id="rId3"/>
+    <p:notesMasterId r:id="rId5"/>
   </p:notesMasterIdLst>
   <p:sldIdLst>
     <p:sldId id="268" r:id="rId2"/>
+    <p:sldId id="269" r:id="rId3"/>
+    <p:sldId id="270" r:id="rId4"/>
   </p:sldIdLst>
   <p:sldSz cx="12192000" cy="6858000"/>
   <p:notesSz cx="6858000" cy="9144000"/>
@@ -107,6 +109,11 @@
       </a:defRPr>
     </a:lvl9pPr>
   </p:defaultTextStyle>
+  <p:extLst>
+    <p:ext uri="{EFAFB233-063F-42B5-8137-9DF3F51BA10A}">
+      <p15:sldGuideLst xmlns:p15="http://schemas.microsoft.com/office/powerpoint/2012/main"/>
+    </p:ext>
+  </p:extLst>
 </p:presentation>
 </file>
 
@@ -192,7 +199,7 @@
           <a:p>
             <a:fld id="{B2D36230-90DE-6F4C-8B78-A9924F978F5D}" type="datetimeFigureOut">
               <a:rPr lang="de-DE" smtClean="0"/>
-              <a:t>14.12.20</a:t>
+              <a:t>25.01.2021</a:t>
             </a:fld>
             <a:endParaRPr lang="de-DE"/>
           </a:p>
@@ -581,6 +588,93 @@
 </p:notes>
 </file>
 
+<file path=ppt/notesSlides/notesSlide2.xml><?xml version="1.0" encoding="utf-8"?>
+<p:notes xmlns:a="http://schemas.openxmlformats.org/drawingml/2006/main" xmlns:r="http://schemas.openxmlformats.org/officeDocument/2006/relationships" xmlns:p="http://schemas.openxmlformats.org/presentationml/2006/main">
+  <p:cSld>
+    <p:spTree>
+      <p:nvGrpSpPr>
+        <p:cNvPr id="1" name=""/>
+        <p:cNvGrpSpPr/>
+        <p:nvPr/>
+      </p:nvGrpSpPr>
+      <p:grpSpPr>
+        <a:xfrm>
+          <a:off x="0" y="0"/>
+          <a:ext cx="0" cy="0"/>
+          <a:chOff x="0" y="0"/>
+          <a:chExt cx="0" cy="0"/>
+        </a:xfrm>
+      </p:grpSpPr>
+      <p:sp>
+        <p:nvSpPr>
+          <p:cNvPr id="2" name="Slide Image Placeholder 1"/>
+          <p:cNvSpPr>
+            <a:spLocks noGrp="1" noRot="1" noChangeAspect="1"/>
+          </p:cNvSpPr>
+          <p:nvPr>
+            <p:ph type="sldImg"/>
+          </p:nvPr>
+        </p:nvSpPr>
+        <p:spPr/>
+      </p:sp>
+      <p:sp>
+        <p:nvSpPr>
+          <p:cNvPr id="3" name="Notes Placeholder 2"/>
+          <p:cNvSpPr>
+            <a:spLocks noGrp="1"/>
+          </p:cNvSpPr>
+          <p:nvPr>
+            <p:ph type="body" idx="1"/>
+          </p:nvPr>
+        </p:nvSpPr>
+        <p:spPr/>
+        <p:txBody>
+          <a:bodyPr/>
+          <a:lstStyle/>
+          <a:p>
+            <a:r>
+              <a:rPr lang="en-DE"/>
+              <a:t>Up to here for course 20200409 Fundamentals in Image Analysis I</a:t>
+            </a:r>
+          </a:p>
+        </p:txBody>
+      </p:sp>
+      <p:sp>
+        <p:nvSpPr>
+          <p:cNvPr id="4" name="Slide Number Placeholder 3"/>
+          <p:cNvSpPr>
+            <a:spLocks noGrp="1"/>
+          </p:cNvSpPr>
+          <p:nvPr>
+            <p:ph type="sldNum" sz="quarter" idx="5"/>
+          </p:nvPr>
+        </p:nvSpPr>
+        <p:spPr/>
+        <p:txBody>
+          <a:bodyPr/>
+          <a:lstStyle/>
+          <a:p>
+            <a:fld id="{5E7C9E7A-7A8D-924B-85BB-F95D9DCC71C8}" type="slidenum">
+              <a:rPr lang="de-DE" smtClean="0"/>
+              <a:t>3</a:t>
+            </a:fld>
+            <a:endParaRPr lang="de-DE"/>
+          </a:p>
+        </p:txBody>
+      </p:sp>
+    </p:spTree>
+    <p:extLst>
+      <p:ext uri="{BB962C8B-B14F-4D97-AF65-F5344CB8AC3E}">
+        <p14:creationId xmlns:p14="http://schemas.microsoft.com/office/powerpoint/2010/main" val="2773886173"/>
+      </p:ext>
+    </p:extLst>
+  </p:cSld>
+  <p:clrMapOvr>
+    <a:masterClrMapping/>
+  </p:clrMapOvr>
+</p:notes>
+</file>
+
 <file path=ppt/slideLayouts/slideLayout1.xml><?xml version="1.0" encoding="utf-8"?>
 <p:sldLayout xmlns:a="http://schemas.openxmlformats.org/drawingml/2006/main" xmlns:r="http://schemas.openxmlformats.org/officeDocument/2006/relationships" xmlns:p="http://schemas.openxmlformats.org/presentationml/2006/main" type="title" preserve="1">
   <p:cSld name="Title Slide">
@@ -730,7 +824,7 @@
           <a:p>
             <a:fld id="{EA7CD4BF-54B3-0F4E-9049-C36E7AA64E59}" type="datetimeFigureOut">
               <a:rPr lang="de-DE" smtClean="0"/>
-              <a:t>14.12.20</a:t>
+              <a:t>25.01.2021</a:t>
             </a:fld>
             <a:endParaRPr lang="de-DE"/>
           </a:p>
@@ -930,7 +1024,7 @@
           <a:p>
             <a:fld id="{EA7CD4BF-54B3-0F4E-9049-C36E7AA64E59}" type="datetimeFigureOut">
               <a:rPr lang="de-DE" smtClean="0"/>
-              <a:t>14.12.20</a:t>
+              <a:t>25.01.2021</a:t>
             </a:fld>
             <a:endParaRPr lang="de-DE"/>
           </a:p>
@@ -1140,7 +1234,7 @@
           <a:p>
             <a:fld id="{EA7CD4BF-54B3-0F4E-9049-C36E7AA64E59}" type="datetimeFigureOut">
               <a:rPr lang="de-DE" smtClean="0"/>
-              <a:t>14.12.20</a:t>
+              <a:t>25.01.2021</a:t>
             </a:fld>
             <a:endParaRPr lang="de-DE"/>
           </a:p>
@@ -1950,7 +2044,7 @@
           <a:p>
             <a:fld id="{EA7CD4BF-54B3-0F4E-9049-C36E7AA64E59}" type="datetimeFigureOut">
               <a:rPr lang="de-DE" smtClean="0"/>
-              <a:t>14.12.20</a:t>
+              <a:t>25.01.2021</a:t>
             </a:fld>
             <a:endParaRPr lang="de-DE"/>
           </a:p>
@@ -2226,7 +2320,7 @@
           <a:p>
             <a:fld id="{EA7CD4BF-54B3-0F4E-9049-C36E7AA64E59}" type="datetimeFigureOut">
               <a:rPr lang="de-DE" smtClean="0"/>
-              <a:t>14.12.20</a:t>
+              <a:t>25.01.2021</a:t>
             </a:fld>
             <a:endParaRPr lang="de-DE"/>
           </a:p>
@@ -2494,7 +2588,7 @@
           <a:p>
             <a:fld id="{EA7CD4BF-54B3-0F4E-9049-C36E7AA64E59}" type="datetimeFigureOut">
               <a:rPr lang="de-DE" smtClean="0"/>
-              <a:t>14.12.20</a:t>
+              <a:t>25.01.2021</a:t>
             </a:fld>
             <a:endParaRPr lang="de-DE"/>
           </a:p>
@@ -2909,7 +3003,7 @@
           <a:p>
             <a:fld id="{EA7CD4BF-54B3-0F4E-9049-C36E7AA64E59}" type="datetimeFigureOut">
               <a:rPr lang="de-DE" smtClean="0"/>
-              <a:t>14.12.20</a:t>
+              <a:t>25.01.2021</a:t>
             </a:fld>
             <a:endParaRPr lang="de-DE"/>
           </a:p>
@@ -3051,7 +3145,7 @@
           <a:p>
             <a:fld id="{EA7CD4BF-54B3-0F4E-9049-C36E7AA64E59}" type="datetimeFigureOut">
               <a:rPr lang="de-DE" smtClean="0"/>
-              <a:t>14.12.20</a:t>
+              <a:t>25.01.2021</a:t>
             </a:fld>
             <a:endParaRPr lang="de-DE"/>
           </a:p>
@@ -3164,7 +3258,7 @@
           <a:p>
             <a:fld id="{EA7CD4BF-54B3-0F4E-9049-C36E7AA64E59}" type="datetimeFigureOut">
               <a:rPr lang="de-DE" smtClean="0"/>
-              <a:t>14.12.20</a:t>
+              <a:t>25.01.2021</a:t>
             </a:fld>
             <a:endParaRPr lang="de-DE"/>
           </a:p>
@@ -3477,7 +3571,7 @@
           <a:p>
             <a:fld id="{EA7CD4BF-54B3-0F4E-9049-C36E7AA64E59}" type="datetimeFigureOut">
               <a:rPr lang="de-DE" smtClean="0"/>
-              <a:t>14.12.20</a:t>
+              <a:t>25.01.2021</a:t>
             </a:fld>
             <a:endParaRPr lang="de-DE"/>
           </a:p>
@@ -3766,7 +3860,7 @@
           <a:p>
             <a:fld id="{EA7CD4BF-54B3-0F4E-9049-C36E7AA64E59}" type="datetimeFigureOut">
               <a:rPr lang="de-DE" smtClean="0"/>
-              <a:t>14.12.20</a:t>
+              <a:t>25.01.2021</a:t>
             </a:fld>
             <a:endParaRPr lang="de-DE"/>
           </a:p>
@@ -4009,7 +4103,7 @@
           <a:p>
             <a:fld id="{EA7CD4BF-54B3-0F4E-9049-C36E7AA64E59}" type="datetimeFigureOut">
               <a:rPr lang="de-DE" smtClean="0"/>
-              <a:t>14.12.20</a:t>
+              <a:t>25.01.2021</a:t>
             </a:fld>
             <a:endParaRPr lang="de-DE"/>
           </a:p>
@@ -4753,6 +4847,3168 @@
     <p:extLst>
       <p:ext uri="{BB962C8B-B14F-4D97-AF65-F5344CB8AC3E}">
         <p14:creationId xmlns:p14="http://schemas.microsoft.com/office/powerpoint/2010/main" val="600477605"/>
+      </p:ext>
+    </p:extLst>
+  </p:cSld>
+  <p:clrMapOvr>
+    <a:masterClrMapping/>
+  </p:clrMapOvr>
+</p:sld>
+</file>
+
+<file path=ppt/slides/slide2.xml><?xml version="1.0" encoding="utf-8"?>
+<p:sld xmlns:a="http://schemas.openxmlformats.org/drawingml/2006/main" xmlns:r="http://schemas.openxmlformats.org/officeDocument/2006/relationships" xmlns:p="http://schemas.openxmlformats.org/presentationml/2006/main">
+  <p:cSld>
+    <p:spTree>
+      <p:nvGrpSpPr>
+        <p:cNvPr id="1" name=""/>
+        <p:cNvGrpSpPr/>
+        <p:nvPr/>
+      </p:nvGrpSpPr>
+      <p:grpSpPr>
+        <a:xfrm>
+          <a:off x="0" y="0"/>
+          <a:ext cx="0" cy="0"/>
+          <a:chOff x="0" y="0"/>
+          <a:chExt cx="0" cy="0"/>
+        </a:xfrm>
+      </p:grpSpPr>
+      <p:sp>
+        <p:nvSpPr>
+          <p:cNvPr id="6" name="TextBox 5">
+            <a:extLst>
+              <a:ext uri="{FF2B5EF4-FFF2-40B4-BE49-F238E27FC236}">
+                <a16:creationId xmlns:a16="http://schemas.microsoft.com/office/drawing/2014/main" id="{EA849C99-188F-0644-B372-2A2456A22563}"/>
+              </a:ext>
+            </a:extLst>
+          </p:cNvPr>
+          <p:cNvSpPr txBox="1"/>
+          <p:nvPr/>
+        </p:nvSpPr>
+        <p:spPr>
+          <a:xfrm>
+            <a:off x="711200" y="4850531"/>
+            <a:ext cx="987643" cy="461665"/>
+          </a:xfrm>
+          <a:prstGeom prst="rect">
+            <a:avLst/>
+          </a:prstGeom>
+          <a:noFill/>
+        </p:spPr>
+        <p:txBody>
+          <a:bodyPr wrap="none" rtlCol="0">
+            <a:spAutoFit/>
+          </a:bodyPr>
+          <a:lstStyle/>
+          <a:p>
+            <a:r>
+              <a:rPr lang="de-DE" sz="2400" dirty="0"/>
+              <a:t>1 Pixel</a:t>
+            </a:r>
+          </a:p>
+        </p:txBody>
+      </p:sp>
+      <p:sp>
+        <p:nvSpPr>
+          <p:cNvPr id="3" name="Rectangle 2">
+            <a:extLst>
+              <a:ext uri="{FF2B5EF4-FFF2-40B4-BE49-F238E27FC236}">
+                <a16:creationId xmlns:a16="http://schemas.microsoft.com/office/drawing/2014/main" id="{3D0F1530-C24E-CD42-A617-B86A0F4CFD3C}"/>
+              </a:ext>
+            </a:extLst>
+          </p:cNvPr>
+          <p:cNvSpPr/>
+          <p:nvPr/>
+        </p:nvSpPr>
+        <p:spPr>
+          <a:xfrm>
+            <a:off x="673034" y="3280723"/>
+            <a:ext cx="1218395" cy="1218395"/>
+          </a:xfrm>
+          <a:prstGeom prst="rect">
+            <a:avLst/>
+          </a:prstGeom>
+        </p:spPr>
+        <p:style>
+          <a:lnRef idx="2">
+            <a:schemeClr val="accent1">
+              <a:shade val="50000"/>
+            </a:schemeClr>
+          </a:lnRef>
+          <a:fillRef idx="1">
+            <a:schemeClr val="accent1"/>
+          </a:fillRef>
+          <a:effectRef idx="0">
+            <a:schemeClr val="accent1"/>
+          </a:effectRef>
+          <a:fontRef idx="minor">
+            <a:schemeClr val="lt1"/>
+          </a:fontRef>
+        </p:style>
+        <p:txBody>
+          <a:bodyPr rtlCol="0" anchor="ctr"/>
+          <a:lstStyle/>
+          <a:p>
+            <a:pPr algn="ctr"/>
+            <a:endParaRPr lang="de-DE"/>
+          </a:p>
+        </p:txBody>
+      </p:sp>
+      <p:sp>
+        <p:nvSpPr>
+          <p:cNvPr id="44" name="Rectangle 43">
+            <a:extLst>
+              <a:ext uri="{FF2B5EF4-FFF2-40B4-BE49-F238E27FC236}">
+                <a16:creationId xmlns:a16="http://schemas.microsoft.com/office/drawing/2014/main" id="{386DB05D-B07A-4442-9044-ED00918557EE}"/>
+              </a:ext>
+            </a:extLst>
+          </p:cNvPr>
+          <p:cNvSpPr/>
+          <p:nvPr/>
+        </p:nvSpPr>
+        <p:spPr>
+          <a:xfrm>
+            <a:off x="4901166" y="3280722"/>
+            <a:ext cx="1218395" cy="1218395"/>
+          </a:xfrm>
+          <a:prstGeom prst="rect">
+            <a:avLst/>
+          </a:prstGeom>
+        </p:spPr>
+        <p:style>
+          <a:lnRef idx="2">
+            <a:schemeClr val="accent1">
+              <a:shade val="50000"/>
+            </a:schemeClr>
+          </a:lnRef>
+          <a:fillRef idx="1">
+            <a:schemeClr val="accent1"/>
+          </a:fillRef>
+          <a:effectRef idx="0">
+            <a:schemeClr val="accent1"/>
+          </a:effectRef>
+          <a:fontRef idx="minor">
+            <a:schemeClr val="lt1"/>
+          </a:fontRef>
+        </p:style>
+        <p:txBody>
+          <a:bodyPr rtlCol="0" anchor="ctr"/>
+          <a:lstStyle/>
+          <a:p>
+            <a:pPr algn="ctr"/>
+            <a:endParaRPr lang="de-DE"/>
+          </a:p>
+        </p:txBody>
+      </p:sp>
+      <p:sp>
+        <p:nvSpPr>
+          <p:cNvPr id="45" name="Rectangle 44">
+            <a:extLst>
+              <a:ext uri="{FF2B5EF4-FFF2-40B4-BE49-F238E27FC236}">
+                <a16:creationId xmlns:a16="http://schemas.microsoft.com/office/drawing/2014/main" id="{A81ED885-D662-FB4F-817F-6926C84B796D}"/>
+              </a:ext>
+            </a:extLst>
+          </p:cNvPr>
+          <p:cNvSpPr/>
+          <p:nvPr/>
+        </p:nvSpPr>
+        <p:spPr>
+          <a:xfrm>
+            <a:off x="4901166" y="2062327"/>
+            <a:ext cx="1218395" cy="1218395"/>
+          </a:xfrm>
+          <a:prstGeom prst="rect">
+            <a:avLst/>
+          </a:prstGeom>
+          <a:solidFill>
+            <a:schemeClr val="accent4">
+              <a:lumMod val="60000"/>
+              <a:lumOff val="40000"/>
+              <a:alpha val="58000"/>
+            </a:schemeClr>
+          </a:solidFill>
+          <a:ln>
+            <a:solidFill>
+              <a:schemeClr val="accent4"/>
+            </a:solidFill>
+          </a:ln>
+        </p:spPr>
+        <p:style>
+          <a:lnRef idx="2">
+            <a:schemeClr val="accent1">
+              <a:shade val="50000"/>
+            </a:schemeClr>
+          </a:lnRef>
+          <a:fillRef idx="1">
+            <a:schemeClr val="accent1"/>
+          </a:fillRef>
+          <a:effectRef idx="0">
+            <a:schemeClr val="accent1"/>
+          </a:effectRef>
+          <a:fontRef idx="minor">
+            <a:schemeClr val="lt1"/>
+          </a:fontRef>
+        </p:style>
+        <p:txBody>
+          <a:bodyPr rtlCol="0" anchor="ctr"/>
+          <a:lstStyle/>
+          <a:p>
+            <a:pPr algn="ctr"/>
+            <a:endParaRPr lang="de-DE"/>
+          </a:p>
+        </p:txBody>
+      </p:sp>
+      <p:sp>
+        <p:nvSpPr>
+          <p:cNvPr id="47" name="Rectangle 46">
+            <a:extLst>
+              <a:ext uri="{FF2B5EF4-FFF2-40B4-BE49-F238E27FC236}">
+                <a16:creationId xmlns:a16="http://schemas.microsoft.com/office/drawing/2014/main" id="{475A1C57-98F9-9549-971A-667A0FFCEFBF}"/>
+              </a:ext>
+            </a:extLst>
+          </p:cNvPr>
+          <p:cNvSpPr/>
+          <p:nvPr/>
+        </p:nvSpPr>
+        <p:spPr>
+          <a:xfrm>
+            <a:off x="3682770" y="3275045"/>
+            <a:ext cx="1218395" cy="1218395"/>
+          </a:xfrm>
+          <a:prstGeom prst="rect">
+            <a:avLst/>
+          </a:prstGeom>
+          <a:solidFill>
+            <a:schemeClr val="accent4">
+              <a:lumMod val="60000"/>
+              <a:lumOff val="40000"/>
+              <a:alpha val="58000"/>
+            </a:schemeClr>
+          </a:solidFill>
+          <a:ln>
+            <a:solidFill>
+              <a:schemeClr val="accent4"/>
+            </a:solidFill>
+          </a:ln>
+        </p:spPr>
+        <p:style>
+          <a:lnRef idx="2">
+            <a:schemeClr val="accent1">
+              <a:shade val="50000"/>
+            </a:schemeClr>
+          </a:lnRef>
+          <a:fillRef idx="1">
+            <a:schemeClr val="accent1"/>
+          </a:fillRef>
+          <a:effectRef idx="0">
+            <a:schemeClr val="accent1"/>
+          </a:effectRef>
+          <a:fontRef idx="minor">
+            <a:schemeClr val="lt1"/>
+          </a:fontRef>
+        </p:style>
+        <p:txBody>
+          <a:bodyPr rtlCol="0" anchor="ctr"/>
+          <a:lstStyle/>
+          <a:p>
+            <a:pPr algn="ctr"/>
+            <a:endParaRPr lang="de-DE"/>
+          </a:p>
+        </p:txBody>
+      </p:sp>
+      <p:sp>
+        <p:nvSpPr>
+          <p:cNvPr id="50" name="Rectangle 49">
+            <a:extLst>
+              <a:ext uri="{FF2B5EF4-FFF2-40B4-BE49-F238E27FC236}">
+                <a16:creationId xmlns:a16="http://schemas.microsoft.com/office/drawing/2014/main" id="{0B8867D2-4D88-144C-9F49-EE53A6362D31}"/>
+              </a:ext>
+            </a:extLst>
+          </p:cNvPr>
+          <p:cNvSpPr/>
+          <p:nvPr/>
+        </p:nvSpPr>
+        <p:spPr>
+          <a:xfrm>
+            <a:off x="4901166" y="4499116"/>
+            <a:ext cx="1218395" cy="1218395"/>
+          </a:xfrm>
+          <a:prstGeom prst="rect">
+            <a:avLst/>
+          </a:prstGeom>
+          <a:solidFill>
+            <a:schemeClr val="accent4">
+              <a:lumMod val="60000"/>
+              <a:lumOff val="40000"/>
+              <a:alpha val="58000"/>
+            </a:schemeClr>
+          </a:solidFill>
+          <a:ln>
+            <a:solidFill>
+              <a:schemeClr val="accent4"/>
+            </a:solidFill>
+          </a:ln>
+        </p:spPr>
+        <p:style>
+          <a:lnRef idx="2">
+            <a:schemeClr val="accent1">
+              <a:shade val="50000"/>
+            </a:schemeClr>
+          </a:lnRef>
+          <a:fillRef idx="1">
+            <a:schemeClr val="accent1"/>
+          </a:fillRef>
+          <a:effectRef idx="0">
+            <a:schemeClr val="accent1"/>
+          </a:effectRef>
+          <a:fontRef idx="minor">
+            <a:schemeClr val="lt1"/>
+          </a:fontRef>
+        </p:style>
+        <p:txBody>
+          <a:bodyPr rtlCol="0" anchor="ctr"/>
+          <a:lstStyle/>
+          <a:p>
+            <a:pPr algn="ctr"/>
+            <a:endParaRPr lang="de-DE"/>
+          </a:p>
+        </p:txBody>
+      </p:sp>
+      <p:sp>
+        <p:nvSpPr>
+          <p:cNvPr id="52" name="Rectangle 51">
+            <a:extLst>
+              <a:ext uri="{FF2B5EF4-FFF2-40B4-BE49-F238E27FC236}">
+                <a16:creationId xmlns:a16="http://schemas.microsoft.com/office/drawing/2014/main" id="{D92DD63D-305B-404A-8B87-E6473579F0AA}"/>
+              </a:ext>
+            </a:extLst>
+          </p:cNvPr>
+          <p:cNvSpPr/>
+          <p:nvPr/>
+        </p:nvSpPr>
+        <p:spPr>
+          <a:xfrm>
+            <a:off x="6119561" y="3286398"/>
+            <a:ext cx="1218395" cy="1218395"/>
+          </a:xfrm>
+          <a:prstGeom prst="rect">
+            <a:avLst/>
+          </a:prstGeom>
+          <a:solidFill>
+            <a:schemeClr val="accent4">
+              <a:lumMod val="60000"/>
+              <a:lumOff val="40000"/>
+              <a:alpha val="58000"/>
+            </a:schemeClr>
+          </a:solidFill>
+          <a:ln>
+            <a:solidFill>
+              <a:schemeClr val="accent4"/>
+            </a:solidFill>
+          </a:ln>
+        </p:spPr>
+        <p:style>
+          <a:lnRef idx="2">
+            <a:schemeClr val="accent1">
+              <a:shade val="50000"/>
+            </a:schemeClr>
+          </a:lnRef>
+          <a:fillRef idx="1">
+            <a:schemeClr val="accent1"/>
+          </a:fillRef>
+          <a:effectRef idx="0">
+            <a:schemeClr val="accent1"/>
+          </a:effectRef>
+          <a:fontRef idx="minor">
+            <a:schemeClr val="lt1"/>
+          </a:fontRef>
+        </p:style>
+        <p:txBody>
+          <a:bodyPr rtlCol="0" anchor="ctr"/>
+          <a:lstStyle/>
+          <a:p>
+            <a:pPr algn="ctr"/>
+            <a:endParaRPr lang="de-DE"/>
+          </a:p>
+        </p:txBody>
+      </p:sp>
+      <p:sp>
+        <p:nvSpPr>
+          <p:cNvPr id="55" name="Rectangle 54">
+            <a:extLst>
+              <a:ext uri="{FF2B5EF4-FFF2-40B4-BE49-F238E27FC236}">
+                <a16:creationId xmlns:a16="http://schemas.microsoft.com/office/drawing/2014/main" id="{5B27B4F4-FE33-404C-B9CB-252F70C0D1FC}"/>
+              </a:ext>
+            </a:extLst>
+          </p:cNvPr>
+          <p:cNvSpPr/>
+          <p:nvPr/>
+        </p:nvSpPr>
+        <p:spPr>
+          <a:xfrm>
+            <a:off x="9412624" y="3280722"/>
+            <a:ext cx="1218395" cy="1218395"/>
+          </a:xfrm>
+          <a:prstGeom prst="rect">
+            <a:avLst/>
+          </a:prstGeom>
+        </p:spPr>
+        <p:style>
+          <a:lnRef idx="2">
+            <a:schemeClr val="accent1">
+              <a:shade val="50000"/>
+            </a:schemeClr>
+          </a:lnRef>
+          <a:fillRef idx="1">
+            <a:schemeClr val="accent1"/>
+          </a:fillRef>
+          <a:effectRef idx="0">
+            <a:schemeClr val="accent1"/>
+          </a:effectRef>
+          <a:fontRef idx="minor">
+            <a:schemeClr val="lt1"/>
+          </a:fontRef>
+        </p:style>
+        <p:txBody>
+          <a:bodyPr rtlCol="0" anchor="ctr"/>
+          <a:lstStyle/>
+          <a:p>
+            <a:pPr algn="ctr"/>
+            <a:endParaRPr lang="de-DE"/>
+          </a:p>
+        </p:txBody>
+      </p:sp>
+      <p:sp>
+        <p:nvSpPr>
+          <p:cNvPr id="56" name="Rectangle 55">
+            <a:extLst>
+              <a:ext uri="{FF2B5EF4-FFF2-40B4-BE49-F238E27FC236}">
+                <a16:creationId xmlns:a16="http://schemas.microsoft.com/office/drawing/2014/main" id="{A6DE3986-910E-3745-BFBF-E1A5D39ABF3A}"/>
+              </a:ext>
+            </a:extLst>
+          </p:cNvPr>
+          <p:cNvSpPr/>
+          <p:nvPr/>
+        </p:nvSpPr>
+        <p:spPr>
+          <a:xfrm>
+            <a:off x="9412624" y="2062327"/>
+            <a:ext cx="1218395" cy="1218395"/>
+          </a:xfrm>
+          <a:prstGeom prst="rect">
+            <a:avLst/>
+          </a:prstGeom>
+          <a:solidFill>
+            <a:schemeClr val="accent6">
+              <a:lumMod val="40000"/>
+              <a:lumOff val="60000"/>
+              <a:alpha val="61000"/>
+            </a:schemeClr>
+          </a:solidFill>
+          <a:ln>
+            <a:solidFill>
+              <a:schemeClr val="accent6"/>
+            </a:solidFill>
+          </a:ln>
+        </p:spPr>
+        <p:style>
+          <a:lnRef idx="2">
+            <a:schemeClr val="accent1">
+              <a:shade val="50000"/>
+            </a:schemeClr>
+          </a:lnRef>
+          <a:fillRef idx="1">
+            <a:schemeClr val="accent1"/>
+          </a:fillRef>
+          <a:effectRef idx="0">
+            <a:schemeClr val="accent1"/>
+          </a:effectRef>
+          <a:fontRef idx="minor">
+            <a:schemeClr val="lt1"/>
+          </a:fontRef>
+        </p:style>
+        <p:txBody>
+          <a:bodyPr rtlCol="0" anchor="ctr"/>
+          <a:lstStyle/>
+          <a:p>
+            <a:pPr algn="ctr"/>
+            <a:endParaRPr lang="de-DE"/>
+          </a:p>
+        </p:txBody>
+      </p:sp>
+      <p:sp>
+        <p:nvSpPr>
+          <p:cNvPr id="57" name="Rectangle 56">
+            <a:extLst>
+              <a:ext uri="{FF2B5EF4-FFF2-40B4-BE49-F238E27FC236}">
+                <a16:creationId xmlns:a16="http://schemas.microsoft.com/office/drawing/2014/main" id="{C584ACCB-5DC6-D847-92D0-0B832F9F17C6}"/>
+              </a:ext>
+            </a:extLst>
+          </p:cNvPr>
+          <p:cNvSpPr/>
+          <p:nvPr/>
+        </p:nvSpPr>
+        <p:spPr>
+          <a:xfrm>
+            <a:off x="8194229" y="2062326"/>
+            <a:ext cx="1218395" cy="1218395"/>
+          </a:xfrm>
+          <a:prstGeom prst="rect">
+            <a:avLst/>
+          </a:prstGeom>
+          <a:solidFill>
+            <a:schemeClr val="accent6">
+              <a:lumMod val="40000"/>
+              <a:lumOff val="60000"/>
+              <a:alpha val="61000"/>
+            </a:schemeClr>
+          </a:solidFill>
+          <a:ln>
+            <a:solidFill>
+              <a:schemeClr val="accent6"/>
+            </a:solidFill>
+          </a:ln>
+        </p:spPr>
+        <p:style>
+          <a:lnRef idx="2">
+            <a:schemeClr val="accent1">
+              <a:shade val="50000"/>
+            </a:schemeClr>
+          </a:lnRef>
+          <a:fillRef idx="1">
+            <a:schemeClr val="accent1"/>
+          </a:fillRef>
+          <a:effectRef idx="0">
+            <a:schemeClr val="accent1"/>
+          </a:effectRef>
+          <a:fontRef idx="minor">
+            <a:schemeClr val="lt1"/>
+          </a:fontRef>
+        </p:style>
+        <p:txBody>
+          <a:bodyPr rtlCol="0" anchor="ctr"/>
+          <a:lstStyle/>
+          <a:p>
+            <a:pPr algn="ctr"/>
+            <a:endParaRPr lang="de-DE"/>
+          </a:p>
+        </p:txBody>
+      </p:sp>
+      <p:sp>
+        <p:nvSpPr>
+          <p:cNvPr id="58" name="Rectangle 57">
+            <a:extLst>
+              <a:ext uri="{FF2B5EF4-FFF2-40B4-BE49-F238E27FC236}">
+                <a16:creationId xmlns:a16="http://schemas.microsoft.com/office/drawing/2014/main" id="{B257027F-979E-304F-AB2E-43D6C0646CE2}"/>
+              </a:ext>
+            </a:extLst>
+          </p:cNvPr>
+          <p:cNvSpPr/>
+          <p:nvPr/>
+        </p:nvSpPr>
+        <p:spPr>
+          <a:xfrm>
+            <a:off x="8194228" y="3275045"/>
+            <a:ext cx="1218395" cy="1218395"/>
+          </a:xfrm>
+          <a:prstGeom prst="rect">
+            <a:avLst/>
+          </a:prstGeom>
+          <a:solidFill>
+            <a:schemeClr val="accent6">
+              <a:lumMod val="40000"/>
+              <a:lumOff val="60000"/>
+              <a:alpha val="61000"/>
+            </a:schemeClr>
+          </a:solidFill>
+          <a:ln>
+            <a:solidFill>
+              <a:schemeClr val="accent6"/>
+            </a:solidFill>
+          </a:ln>
+        </p:spPr>
+        <p:style>
+          <a:lnRef idx="2">
+            <a:schemeClr val="accent1">
+              <a:shade val="50000"/>
+            </a:schemeClr>
+          </a:lnRef>
+          <a:fillRef idx="1">
+            <a:schemeClr val="accent1"/>
+          </a:fillRef>
+          <a:effectRef idx="0">
+            <a:schemeClr val="accent1"/>
+          </a:effectRef>
+          <a:fontRef idx="minor">
+            <a:schemeClr val="lt1"/>
+          </a:fontRef>
+        </p:style>
+        <p:txBody>
+          <a:bodyPr rtlCol="0" anchor="ctr"/>
+          <a:lstStyle/>
+          <a:p>
+            <a:pPr algn="ctr"/>
+            <a:endParaRPr lang="de-DE"/>
+          </a:p>
+        </p:txBody>
+      </p:sp>
+      <p:sp>
+        <p:nvSpPr>
+          <p:cNvPr id="59" name="Rectangle 58">
+            <a:extLst>
+              <a:ext uri="{FF2B5EF4-FFF2-40B4-BE49-F238E27FC236}">
+                <a16:creationId xmlns:a16="http://schemas.microsoft.com/office/drawing/2014/main" id="{29359A54-B227-0540-B3D5-BF93B4E3099F}"/>
+              </a:ext>
+            </a:extLst>
+          </p:cNvPr>
+          <p:cNvSpPr/>
+          <p:nvPr/>
+        </p:nvSpPr>
+        <p:spPr>
+          <a:xfrm>
+            <a:off x="8194228" y="4487763"/>
+            <a:ext cx="1218395" cy="1218395"/>
+          </a:xfrm>
+          <a:prstGeom prst="rect">
+            <a:avLst/>
+          </a:prstGeom>
+          <a:solidFill>
+            <a:schemeClr val="accent6">
+              <a:lumMod val="40000"/>
+              <a:lumOff val="60000"/>
+              <a:alpha val="61000"/>
+            </a:schemeClr>
+          </a:solidFill>
+          <a:ln>
+            <a:solidFill>
+              <a:schemeClr val="accent6"/>
+            </a:solidFill>
+          </a:ln>
+        </p:spPr>
+        <p:style>
+          <a:lnRef idx="2">
+            <a:schemeClr val="accent1">
+              <a:shade val="50000"/>
+            </a:schemeClr>
+          </a:lnRef>
+          <a:fillRef idx="1">
+            <a:schemeClr val="accent1"/>
+          </a:fillRef>
+          <a:effectRef idx="0">
+            <a:schemeClr val="accent1"/>
+          </a:effectRef>
+          <a:fontRef idx="minor">
+            <a:schemeClr val="lt1"/>
+          </a:fontRef>
+        </p:style>
+        <p:txBody>
+          <a:bodyPr rtlCol="0" anchor="ctr"/>
+          <a:lstStyle/>
+          <a:p>
+            <a:pPr algn="ctr"/>
+            <a:endParaRPr lang="de-DE"/>
+          </a:p>
+        </p:txBody>
+      </p:sp>
+      <p:sp>
+        <p:nvSpPr>
+          <p:cNvPr id="60" name="Rectangle 59">
+            <a:extLst>
+              <a:ext uri="{FF2B5EF4-FFF2-40B4-BE49-F238E27FC236}">
+                <a16:creationId xmlns:a16="http://schemas.microsoft.com/office/drawing/2014/main" id="{50D47048-2896-CB45-B62E-95397247918C}"/>
+              </a:ext>
+            </a:extLst>
+          </p:cNvPr>
+          <p:cNvSpPr/>
+          <p:nvPr/>
+        </p:nvSpPr>
+        <p:spPr>
+          <a:xfrm>
+            <a:off x="9412624" y="4499116"/>
+            <a:ext cx="1218395" cy="1218395"/>
+          </a:xfrm>
+          <a:prstGeom prst="rect">
+            <a:avLst/>
+          </a:prstGeom>
+          <a:solidFill>
+            <a:schemeClr val="accent6">
+              <a:lumMod val="40000"/>
+              <a:lumOff val="60000"/>
+              <a:alpha val="61000"/>
+            </a:schemeClr>
+          </a:solidFill>
+          <a:ln>
+            <a:solidFill>
+              <a:schemeClr val="accent6"/>
+            </a:solidFill>
+          </a:ln>
+        </p:spPr>
+        <p:style>
+          <a:lnRef idx="2">
+            <a:schemeClr val="accent1">
+              <a:shade val="50000"/>
+            </a:schemeClr>
+          </a:lnRef>
+          <a:fillRef idx="1">
+            <a:schemeClr val="accent1"/>
+          </a:fillRef>
+          <a:effectRef idx="0">
+            <a:schemeClr val="accent1"/>
+          </a:effectRef>
+          <a:fontRef idx="minor">
+            <a:schemeClr val="lt1"/>
+          </a:fontRef>
+        </p:style>
+        <p:txBody>
+          <a:bodyPr rtlCol="0" anchor="ctr"/>
+          <a:lstStyle/>
+          <a:p>
+            <a:pPr algn="ctr"/>
+            <a:endParaRPr lang="de-DE"/>
+          </a:p>
+        </p:txBody>
+      </p:sp>
+      <p:sp>
+        <p:nvSpPr>
+          <p:cNvPr id="61" name="Rectangle 60">
+            <a:extLst>
+              <a:ext uri="{FF2B5EF4-FFF2-40B4-BE49-F238E27FC236}">
+                <a16:creationId xmlns:a16="http://schemas.microsoft.com/office/drawing/2014/main" id="{88F41EF7-411C-AE44-AF2D-0BEBE1A3DC49}"/>
+              </a:ext>
+            </a:extLst>
+          </p:cNvPr>
+          <p:cNvSpPr/>
+          <p:nvPr/>
+        </p:nvSpPr>
+        <p:spPr>
+          <a:xfrm>
+            <a:off x="10631019" y="2062326"/>
+            <a:ext cx="1218395" cy="1218395"/>
+          </a:xfrm>
+          <a:prstGeom prst="rect">
+            <a:avLst/>
+          </a:prstGeom>
+          <a:solidFill>
+            <a:schemeClr val="accent6">
+              <a:lumMod val="40000"/>
+              <a:lumOff val="60000"/>
+              <a:alpha val="61000"/>
+            </a:schemeClr>
+          </a:solidFill>
+          <a:ln>
+            <a:solidFill>
+              <a:schemeClr val="accent6"/>
+            </a:solidFill>
+          </a:ln>
+        </p:spPr>
+        <p:style>
+          <a:lnRef idx="2">
+            <a:schemeClr val="accent1">
+              <a:shade val="50000"/>
+            </a:schemeClr>
+          </a:lnRef>
+          <a:fillRef idx="1">
+            <a:schemeClr val="accent1"/>
+          </a:fillRef>
+          <a:effectRef idx="0">
+            <a:schemeClr val="accent1"/>
+          </a:effectRef>
+          <a:fontRef idx="minor">
+            <a:schemeClr val="lt1"/>
+          </a:fontRef>
+        </p:style>
+        <p:txBody>
+          <a:bodyPr rtlCol="0" anchor="ctr"/>
+          <a:lstStyle/>
+          <a:p>
+            <a:pPr algn="ctr"/>
+            <a:endParaRPr lang="de-DE"/>
+          </a:p>
+        </p:txBody>
+      </p:sp>
+      <p:sp>
+        <p:nvSpPr>
+          <p:cNvPr id="93" name="Rectangle 92">
+            <a:extLst>
+              <a:ext uri="{FF2B5EF4-FFF2-40B4-BE49-F238E27FC236}">
+                <a16:creationId xmlns:a16="http://schemas.microsoft.com/office/drawing/2014/main" id="{DEDEC721-EC00-0043-ABED-AB36477BC0C4}"/>
+              </a:ext>
+            </a:extLst>
+          </p:cNvPr>
+          <p:cNvSpPr/>
+          <p:nvPr/>
+        </p:nvSpPr>
+        <p:spPr>
+          <a:xfrm>
+            <a:off x="10631019" y="3286398"/>
+            <a:ext cx="1218395" cy="1218395"/>
+          </a:xfrm>
+          <a:prstGeom prst="rect">
+            <a:avLst/>
+          </a:prstGeom>
+          <a:solidFill>
+            <a:schemeClr val="accent6">
+              <a:lumMod val="40000"/>
+              <a:lumOff val="60000"/>
+              <a:alpha val="61000"/>
+            </a:schemeClr>
+          </a:solidFill>
+          <a:ln>
+            <a:solidFill>
+              <a:schemeClr val="accent6"/>
+            </a:solidFill>
+          </a:ln>
+        </p:spPr>
+        <p:style>
+          <a:lnRef idx="2">
+            <a:schemeClr val="accent1">
+              <a:shade val="50000"/>
+            </a:schemeClr>
+          </a:lnRef>
+          <a:fillRef idx="1">
+            <a:schemeClr val="accent1"/>
+          </a:fillRef>
+          <a:effectRef idx="0">
+            <a:schemeClr val="accent1"/>
+          </a:effectRef>
+          <a:fontRef idx="minor">
+            <a:schemeClr val="lt1"/>
+          </a:fontRef>
+        </p:style>
+        <p:txBody>
+          <a:bodyPr rtlCol="0" anchor="ctr"/>
+          <a:lstStyle/>
+          <a:p>
+            <a:pPr algn="ctr"/>
+            <a:endParaRPr lang="de-DE"/>
+          </a:p>
+        </p:txBody>
+      </p:sp>
+      <p:sp>
+        <p:nvSpPr>
+          <p:cNvPr id="94" name="Rectangle 93">
+            <a:extLst>
+              <a:ext uri="{FF2B5EF4-FFF2-40B4-BE49-F238E27FC236}">
+                <a16:creationId xmlns:a16="http://schemas.microsoft.com/office/drawing/2014/main" id="{7812896B-CDEB-6B40-BCD0-047867721594}"/>
+              </a:ext>
+            </a:extLst>
+          </p:cNvPr>
+          <p:cNvSpPr/>
+          <p:nvPr/>
+        </p:nvSpPr>
+        <p:spPr>
+          <a:xfrm>
+            <a:off x="10631019" y="4497217"/>
+            <a:ext cx="1218395" cy="1218395"/>
+          </a:xfrm>
+          <a:prstGeom prst="rect">
+            <a:avLst/>
+          </a:prstGeom>
+          <a:solidFill>
+            <a:schemeClr val="accent6">
+              <a:lumMod val="40000"/>
+              <a:lumOff val="60000"/>
+              <a:alpha val="61000"/>
+            </a:schemeClr>
+          </a:solidFill>
+          <a:ln>
+            <a:solidFill>
+              <a:schemeClr val="accent6"/>
+            </a:solidFill>
+          </a:ln>
+        </p:spPr>
+        <p:style>
+          <a:lnRef idx="2">
+            <a:schemeClr val="accent1">
+              <a:shade val="50000"/>
+            </a:schemeClr>
+          </a:lnRef>
+          <a:fillRef idx="1">
+            <a:schemeClr val="accent1"/>
+          </a:fillRef>
+          <a:effectRef idx="0">
+            <a:schemeClr val="accent1"/>
+          </a:effectRef>
+          <a:fontRef idx="minor">
+            <a:schemeClr val="lt1"/>
+          </a:fontRef>
+        </p:style>
+        <p:txBody>
+          <a:bodyPr rtlCol="0" anchor="ctr"/>
+          <a:lstStyle/>
+          <a:p>
+            <a:pPr algn="ctr"/>
+            <a:endParaRPr lang="de-DE"/>
+          </a:p>
+        </p:txBody>
+      </p:sp>
+      <p:sp>
+        <p:nvSpPr>
+          <p:cNvPr id="95" name="TextBox 94">
+            <a:extLst>
+              <a:ext uri="{FF2B5EF4-FFF2-40B4-BE49-F238E27FC236}">
+                <a16:creationId xmlns:a16="http://schemas.microsoft.com/office/drawing/2014/main" id="{345F06F5-7843-894B-B38D-8674B768D0DE}"/>
+              </a:ext>
+            </a:extLst>
+          </p:cNvPr>
+          <p:cNvSpPr txBox="1"/>
+          <p:nvPr/>
+        </p:nvSpPr>
+        <p:spPr>
+          <a:xfrm>
+            <a:off x="4494431" y="6040808"/>
+            <a:ext cx="1956626" cy="461665"/>
+          </a:xfrm>
+          <a:prstGeom prst="rect">
+            <a:avLst/>
+          </a:prstGeom>
+          <a:noFill/>
+        </p:spPr>
+        <p:txBody>
+          <a:bodyPr wrap="none" rtlCol="0">
+            <a:spAutoFit/>
+          </a:bodyPr>
+          <a:lstStyle/>
+          <a:p>
+            <a:r>
+              <a:rPr lang="de-DE" sz="2400" dirty="0"/>
+              <a:t>4-connectivity</a:t>
+            </a:r>
+          </a:p>
+        </p:txBody>
+      </p:sp>
+      <p:sp>
+        <p:nvSpPr>
+          <p:cNvPr id="96" name="TextBox 95">
+            <a:extLst>
+              <a:ext uri="{FF2B5EF4-FFF2-40B4-BE49-F238E27FC236}">
+                <a16:creationId xmlns:a16="http://schemas.microsoft.com/office/drawing/2014/main" id="{D993F54E-E9CD-494F-B648-AB7C3E308B37}"/>
+              </a:ext>
+            </a:extLst>
+          </p:cNvPr>
+          <p:cNvSpPr txBox="1"/>
+          <p:nvPr/>
+        </p:nvSpPr>
+        <p:spPr>
+          <a:xfrm>
+            <a:off x="8953702" y="6040808"/>
+            <a:ext cx="1956626" cy="461665"/>
+          </a:xfrm>
+          <a:prstGeom prst="rect">
+            <a:avLst/>
+          </a:prstGeom>
+          <a:noFill/>
+        </p:spPr>
+        <p:txBody>
+          <a:bodyPr wrap="none" rtlCol="0">
+            <a:spAutoFit/>
+          </a:bodyPr>
+          <a:lstStyle/>
+          <a:p>
+            <a:r>
+              <a:rPr lang="de-DE" sz="2400" dirty="0"/>
+              <a:t>8-connectivity</a:t>
+            </a:r>
+          </a:p>
+        </p:txBody>
+      </p:sp>
+      <p:sp>
+        <p:nvSpPr>
+          <p:cNvPr id="21" name="Google Shape;204;p24"/>
+          <p:cNvSpPr txBox="1">
+            <a:spLocks/>
+          </p:cNvSpPr>
+          <p:nvPr/>
+        </p:nvSpPr>
+        <p:spPr>
+          <a:xfrm>
+            <a:off x="1633045" y="689479"/>
+            <a:ext cx="9205650" cy="763650"/>
+          </a:xfrm>
+          <a:prstGeom prst="rect">
+            <a:avLst/>
+          </a:prstGeom>
+          <a:noFill/>
+          <a:ln>
+            <a:noFill/>
+          </a:ln>
+        </p:spPr>
+        <p:txBody>
+          <a:bodyPr spcFirstLastPara="1" vert="horz" wrap="square" lIns="121888" tIns="121888" rIns="121888" bIns="121888" rtlCol="0" anchor="t" anchorCtr="0">
+            <a:noAutofit/>
+          </a:bodyPr>
+          <a:lstStyle>
+            <a:lvl1pPr algn="l" defTabSz="914400" rtl="0" eaLnBrk="1" latinLnBrk="0" hangingPunct="1">
+              <a:lnSpc>
+                <a:spcPct val="90000"/>
+              </a:lnSpc>
+              <a:spcBef>
+                <a:spcPct val="0"/>
+              </a:spcBef>
+              <a:buNone/>
+              <a:defRPr sz="4400" kern="1200">
+                <a:solidFill>
+                  <a:schemeClr val="tx1"/>
+                </a:solidFill>
+                <a:latin typeface="+mj-lt"/>
+                <a:ea typeface="+mj-ea"/>
+                <a:cs typeface="+mj-cs"/>
+              </a:defRPr>
+            </a:lvl1pPr>
+          </a:lstStyle>
+          <a:p>
+            <a:pPr algn="ctr">
+              <a:buSzPts val="5800"/>
+            </a:pPr>
+            <a:r>
+              <a:rPr lang="en-US" sz="3600" dirty="0" smtClean="0">
+                <a:solidFill>
+                  <a:srgbClr val="93C47D"/>
+                </a:solidFill>
+              </a:rPr>
+              <a:t>Connectivity in 2D</a:t>
+            </a:r>
+            <a:endParaRPr lang="en-US" sz="3600" dirty="0">
+              <a:solidFill>
+                <a:srgbClr val="93C47D"/>
+              </a:solidFill>
+            </a:endParaRPr>
+          </a:p>
+        </p:txBody>
+      </p:sp>
+    </p:spTree>
+    <p:extLst>
+      <p:ext uri="{BB962C8B-B14F-4D97-AF65-F5344CB8AC3E}">
+        <p14:creationId xmlns:p14="http://schemas.microsoft.com/office/powerpoint/2010/main" val="4026980001"/>
+      </p:ext>
+    </p:extLst>
+  </p:cSld>
+  <p:clrMapOvr>
+    <a:masterClrMapping/>
+  </p:clrMapOvr>
+</p:sld>
+</file>
+
+<file path=ppt/slides/slide3.xml><?xml version="1.0" encoding="utf-8"?>
+<p:sld xmlns:a="http://schemas.openxmlformats.org/drawingml/2006/main" xmlns:r="http://schemas.openxmlformats.org/officeDocument/2006/relationships" xmlns:p="http://schemas.openxmlformats.org/presentationml/2006/main">
+  <p:cSld>
+    <p:spTree>
+      <p:nvGrpSpPr>
+        <p:cNvPr id="1" name=""/>
+        <p:cNvGrpSpPr/>
+        <p:nvPr/>
+      </p:nvGrpSpPr>
+      <p:grpSpPr>
+        <a:xfrm>
+          <a:off x="0" y="0"/>
+          <a:ext cx="0" cy="0"/>
+          <a:chOff x="0" y="0"/>
+          <a:chExt cx="0" cy="0"/>
+        </a:xfrm>
+      </p:grpSpPr>
+      <p:sp>
+        <p:nvSpPr>
+          <p:cNvPr id="48" name="Cube 47">
+            <a:extLst>
+              <a:ext uri="{FF2B5EF4-FFF2-40B4-BE49-F238E27FC236}">
+                <a16:creationId xmlns:a16="http://schemas.microsoft.com/office/drawing/2014/main" id="{BE233057-4145-BB4F-88B9-C8ECF261390C}"/>
+              </a:ext>
+            </a:extLst>
+          </p:cNvPr>
+          <p:cNvSpPr/>
+          <p:nvPr/>
+        </p:nvSpPr>
+        <p:spPr>
+          <a:xfrm>
+            <a:off x="711200" y="3103348"/>
+            <a:ext cx="1408296" cy="1408296"/>
+          </a:xfrm>
+          <a:prstGeom prst="cube">
+            <a:avLst/>
+          </a:prstGeom>
+          <a:solidFill>
+            <a:schemeClr val="accent1"/>
+          </a:solidFill>
+        </p:spPr>
+        <p:style>
+          <a:lnRef idx="2">
+            <a:schemeClr val="accent1">
+              <a:shade val="50000"/>
+            </a:schemeClr>
+          </a:lnRef>
+          <a:fillRef idx="1">
+            <a:schemeClr val="accent1"/>
+          </a:fillRef>
+          <a:effectRef idx="0">
+            <a:schemeClr val="accent1"/>
+          </a:effectRef>
+          <a:fontRef idx="minor">
+            <a:schemeClr val="lt1"/>
+          </a:fontRef>
+        </p:style>
+        <p:txBody>
+          <a:bodyPr rtlCol="0" anchor="ctr"/>
+          <a:lstStyle/>
+          <a:p>
+            <a:pPr algn="ctr"/>
+            <a:endParaRPr lang="de-DE"/>
+          </a:p>
+        </p:txBody>
+      </p:sp>
+      <p:sp>
+        <p:nvSpPr>
+          <p:cNvPr id="39" name="Cube 38">
+            <a:extLst>
+              <a:ext uri="{FF2B5EF4-FFF2-40B4-BE49-F238E27FC236}">
+                <a16:creationId xmlns:a16="http://schemas.microsoft.com/office/drawing/2014/main" id="{54F0DE8E-DC30-6F44-9AA4-373174C8D5F7}"/>
+              </a:ext>
+            </a:extLst>
+          </p:cNvPr>
+          <p:cNvSpPr/>
+          <p:nvPr/>
+        </p:nvSpPr>
+        <p:spPr>
+          <a:xfrm>
+            <a:off x="4195781" y="4132030"/>
+            <a:ext cx="1408296" cy="1408296"/>
+          </a:xfrm>
+          <a:prstGeom prst="cube">
+            <a:avLst/>
+          </a:prstGeom>
+          <a:solidFill>
+            <a:schemeClr val="accent2">
+              <a:lumMod val="60000"/>
+              <a:lumOff val="40000"/>
+              <a:alpha val="78000"/>
+            </a:schemeClr>
+          </a:solidFill>
+        </p:spPr>
+        <p:style>
+          <a:lnRef idx="2">
+            <a:schemeClr val="accent1">
+              <a:shade val="50000"/>
+            </a:schemeClr>
+          </a:lnRef>
+          <a:fillRef idx="1">
+            <a:schemeClr val="accent1"/>
+          </a:fillRef>
+          <a:effectRef idx="0">
+            <a:schemeClr val="accent1"/>
+          </a:effectRef>
+          <a:fontRef idx="minor">
+            <a:schemeClr val="lt1"/>
+          </a:fontRef>
+        </p:style>
+        <p:txBody>
+          <a:bodyPr rtlCol="0" anchor="ctr"/>
+          <a:lstStyle/>
+          <a:p>
+            <a:pPr algn="ctr"/>
+            <a:endParaRPr lang="de-DE"/>
+          </a:p>
+        </p:txBody>
+      </p:sp>
+      <p:sp>
+        <p:nvSpPr>
+          <p:cNvPr id="40" name="Cube 39">
+            <a:extLst>
+              <a:ext uri="{FF2B5EF4-FFF2-40B4-BE49-F238E27FC236}">
+                <a16:creationId xmlns:a16="http://schemas.microsoft.com/office/drawing/2014/main" id="{A12A1F3E-1B10-4D4E-A337-B4DFB0314999}"/>
+              </a:ext>
+            </a:extLst>
+          </p:cNvPr>
+          <p:cNvSpPr/>
+          <p:nvPr/>
+        </p:nvSpPr>
+        <p:spPr>
+          <a:xfrm>
+            <a:off x="4562545" y="2763854"/>
+            <a:ext cx="1408296" cy="1408296"/>
+          </a:xfrm>
+          <a:prstGeom prst="cube">
+            <a:avLst/>
+          </a:prstGeom>
+          <a:solidFill>
+            <a:schemeClr val="accent2">
+              <a:lumMod val="60000"/>
+              <a:lumOff val="40000"/>
+              <a:alpha val="85000"/>
+            </a:schemeClr>
+          </a:solidFill>
+        </p:spPr>
+        <p:style>
+          <a:lnRef idx="2">
+            <a:schemeClr val="accent1">
+              <a:shade val="50000"/>
+            </a:schemeClr>
+          </a:lnRef>
+          <a:fillRef idx="1">
+            <a:schemeClr val="accent1"/>
+          </a:fillRef>
+          <a:effectRef idx="0">
+            <a:schemeClr val="accent1"/>
+          </a:effectRef>
+          <a:fontRef idx="minor">
+            <a:schemeClr val="lt1"/>
+          </a:fontRef>
+        </p:style>
+        <p:txBody>
+          <a:bodyPr rtlCol="0" anchor="ctr"/>
+          <a:lstStyle/>
+          <a:p>
+            <a:pPr algn="ctr"/>
+            <a:endParaRPr lang="de-DE"/>
+          </a:p>
+        </p:txBody>
+      </p:sp>
+      <p:sp>
+        <p:nvSpPr>
+          <p:cNvPr id="41" name="Cube 40">
+            <a:extLst>
+              <a:ext uri="{FF2B5EF4-FFF2-40B4-BE49-F238E27FC236}">
+                <a16:creationId xmlns:a16="http://schemas.microsoft.com/office/drawing/2014/main" id="{274405A3-C032-2C4F-B6C5-1648C71C4E9B}"/>
+              </a:ext>
+            </a:extLst>
+          </p:cNvPr>
+          <p:cNvSpPr/>
+          <p:nvPr/>
+        </p:nvSpPr>
+        <p:spPr>
+          <a:xfrm>
+            <a:off x="3136002" y="3117416"/>
+            <a:ext cx="1408296" cy="1408296"/>
+          </a:xfrm>
+          <a:prstGeom prst="cube">
+            <a:avLst/>
+          </a:prstGeom>
+          <a:solidFill>
+            <a:schemeClr val="accent2">
+              <a:lumMod val="60000"/>
+              <a:lumOff val="40000"/>
+            </a:schemeClr>
+          </a:solidFill>
+        </p:spPr>
+        <p:style>
+          <a:lnRef idx="2">
+            <a:schemeClr val="accent1">
+              <a:shade val="50000"/>
+            </a:schemeClr>
+          </a:lnRef>
+          <a:fillRef idx="1">
+            <a:schemeClr val="accent1"/>
+          </a:fillRef>
+          <a:effectRef idx="0">
+            <a:schemeClr val="accent1"/>
+          </a:effectRef>
+          <a:fontRef idx="minor">
+            <a:schemeClr val="lt1"/>
+          </a:fontRef>
+        </p:style>
+        <p:txBody>
+          <a:bodyPr rtlCol="0" anchor="ctr"/>
+          <a:lstStyle/>
+          <a:p>
+            <a:pPr algn="ctr"/>
+            <a:endParaRPr lang="de-DE"/>
+          </a:p>
+        </p:txBody>
+      </p:sp>
+      <p:sp>
+        <p:nvSpPr>
+          <p:cNvPr id="42" name="Cube 41">
+            <a:extLst>
+              <a:ext uri="{FF2B5EF4-FFF2-40B4-BE49-F238E27FC236}">
+                <a16:creationId xmlns:a16="http://schemas.microsoft.com/office/drawing/2014/main" id="{2A93A355-2DD9-D445-B395-919AE4E7FF88}"/>
+              </a:ext>
+            </a:extLst>
+          </p:cNvPr>
+          <p:cNvSpPr/>
+          <p:nvPr/>
+        </p:nvSpPr>
+        <p:spPr>
+          <a:xfrm>
+            <a:off x="4193435" y="3102743"/>
+            <a:ext cx="1408296" cy="1408296"/>
+          </a:xfrm>
+          <a:prstGeom prst="cube">
+            <a:avLst/>
+          </a:prstGeom>
+          <a:solidFill>
+            <a:schemeClr val="accent1"/>
+          </a:solidFill>
+        </p:spPr>
+        <p:style>
+          <a:lnRef idx="2">
+            <a:schemeClr val="accent1">
+              <a:shade val="50000"/>
+            </a:schemeClr>
+          </a:lnRef>
+          <a:fillRef idx="1">
+            <a:schemeClr val="accent1"/>
+          </a:fillRef>
+          <a:effectRef idx="0">
+            <a:schemeClr val="accent1"/>
+          </a:effectRef>
+          <a:fontRef idx="minor">
+            <a:schemeClr val="lt1"/>
+          </a:fontRef>
+        </p:style>
+        <p:txBody>
+          <a:bodyPr rtlCol="0" anchor="ctr"/>
+          <a:lstStyle/>
+          <a:p>
+            <a:pPr algn="ctr"/>
+            <a:endParaRPr lang="de-DE"/>
+          </a:p>
+        </p:txBody>
+      </p:sp>
+      <p:sp>
+        <p:nvSpPr>
+          <p:cNvPr id="43" name="Cube 42">
+            <a:extLst>
+              <a:ext uri="{FF2B5EF4-FFF2-40B4-BE49-F238E27FC236}">
+                <a16:creationId xmlns:a16="http://schemas.microsoft.com/office/drawing/2014/main" id="{B0DC8176-1AC5-E540-8BD9-DF4876C10A97}"/>
+              </a:ext>
+            </a:extLst>
+          </p:cNvPr>
+          <p:cNvSpPr/>
+          <p:nvPr/>
+        </p:nvSpPr>
+        <p:spPr>
+          <a:xfrm>
+            <a:off x="3853640" y="3442235"/>
+            <a:ext cx="1408296" cy="1408296"/>
+          </a:xfrm>
+          <a:prstGeom prst="cube">
+            <a:avLst/>
+          </a:prstGeom>
+          <a:solidFill>
+            <a:schemeClr val="accent2">
+              <a:lumMod val="60000"/>
+              <a:lumOff val="40000"/>
+              <a:alpha val="88000"/>
+            </a:schemeClr>
+          </a:solidFill>
+        </p:spPr>
+        <p:style>
+          <a:lnRef idx="2">
+            <a:schemeClr val="accent1">
+              <a:shade val="50000"/>
+            </a:schemeClr>
+          </a:lnRef>
+          <a:fillRef idx="1">
+            <a:schemeClr val="accent1"/>
+          </a:fillRef>
+          <a:effectRef idx="0">
+            <a:schemeClr val="accent1"/>
+          </a:effectRef>
+          <a:fontRef idx="minor">
+            <a:schemeClr val="lt1"/>
+          </a:fontRef>
+        </p:style>
+        <p:txBody>
+          <a:bodyPr rtlCol="0" anchor="ctr"/>
+          <a:lstStyle/>
+          <a:p>
+            <a:pPr algn="ctr"/>
+            <a:endParaRPr lang="de-DE"/>
+          </a:p>
+        </p:txBody>
+      </p:sp>
+      <p:sp>
+        <p:nvSpPr>
+          <p:cNvPr id="62" name="Cube 61">
+            <a:extLst>
+              <a:ext uri="{FF2B5EF4-FFF2-40B4-BE49-F238E27FC236}">
+                <a16:creationId xmlns:a16="http://schemas.microsoft.com/office/drawing/2014/main" id="{1E7DAB7F-952F-F34D-BFC8-54EA6151BEC2}"/>
+              </a:ext>
+            </a:extLst>
+          </p:cNvPr>
+          <p:cNvSpPr/>
+          <p:nvPr/>
+        </p:nvSpPr>
+        <p:spPr>
+          <a:xfrm>
+            <a:off x="5273003" y="3103348"/>
+            <a:ext cx="1408296" cy="1408296"/>
+          </a:xfrm>
+          <a:prstGeom prst="cube">
+            <a:avLst/>
+          </a:prstGeom>
+          <a:solidFill>
+            <a:schemeClr val="accent2">
+              <a:lumMod val="60000"/>
+              <a:lumOff val="40000"/>
+              <a:alpha val="86000"/>
+            </a:schemeClr>
+          </a:solidFill>
+        </p:spPr>
+        <p:style>
+          <a:lnRef idx="2">
+            <a:schemeClr val="accent1">
+              <a:shade val="50000"/>
+            </a:schemeClr>
+          </a:lnRef>
+          <a:fillRef idx="1">
+            <a:schemeClr val="accent1"/>
+          </a:fillRef>
+          <a:effectRef idx="0">
+            <a:schemeClr val="accent1"/>
+          </a:effectRef>
+          <a:fontRef idx="minor">
+            <a:schemeClr val="lt1"/>
+          </a:fontRef>
+        </p:style>
+        <p:txBody>
+          <a:bodyPr rtlCol="0" anchor="ctr"/>
+          <a:lstStyle/>
+          <a:p>
+            <a:pPr algn="ctr"/>
+            <a:endParaRPr lang="de-DE"/>
+          </a:p>
+        </p:txBody>
+      </p:sp>
+      <p:sp>
+        <p:nvSpPr>
+          <p:cNvPr id="63" name="Cube 62">
+            <a:extLst>
+              <a:ext uri="{FF2B5EF4-FFF2-40B4-BE49-F238E27FC236}">
+                <a16:creationId xmlns:a16="http://schemas.microsoft.com/office/drawing/2014/main" id="{2EEC8B73-68C7-924F-831C-713F8A90BC8B}"/>
+              </a:ext>
+            </a:extLst>
+          </p:cNvPr>
+          <p:cNvSpPr/>
+          <p:nvPr/>
+        </p:nvSpPr>
+        <p:spPr>
+          <a:xfrm>
+            <a:off x="4206291" y="2048253"/>
+            <a:ext cx="1408296" cy="1408296"/>
+          </a:xfrm>
+          <a:prstGeom prst="cube">
+            <a:avLst/>
+          </a:prstGeom>
+          <a:solidFill>
+            <a:schemeClr val="accent2">
+              <a:lumMod val="60000"/>
+              <a:lumOff val="40000"/>
+              <a:alpha val="70000"/>
+            </a:schemeClr>
+          </a:solidFill>
+        </p:spPr>
+        <p:style>
+          <a:lnRef idx="2">
+            <a:schemeClr val="accent1">
+              <a:shade val="50000"/>
+            </a:schemeClr>
+          </a:lnRef>
+          <a:fillRef idx="1">
+            <a:schemeClr val="accent1"/>
+          </a:fillRef>
+          <a:effectRef idx="0">
+            <a:schemeClr val="accent1"/>
+          </a:effectRef>
+          <a:fontRef idx="minor">
+            <a:schemeClr val="lt1"/>
+          </a:fontRef>
+        </p:style>
+        <p:txBody>
+          <a:bodyPr rtlCol="0" anchor="ctr"/>
+          <a:lstStyle/>
+          <a:p>
+            <a:pPr algn="ctr"/>
+            <a:endParaRPr lang="de-DE"/>
+          </a:p>
+        </p:txBody>
+      </p:sp>
+      <p:sp>
+        <p:nvSpPr>
+          <p:cNvPr id="64" name="Cube 63">
+            <a:extLst>
+              <a:ext uri="{FF2B5EF4-FFF2-40B4-BE49-F238E27FC236}">
+                <a16:creationId xmlns:a16="http://schemas.microsoft.com/office/drawing/2014/main" id="{4CD355D4-88B7-624F-92B0-F5EC35D6F16A}"/>
+              </a:ext>
+            </a:extLst>
+          </p:cNvPr>
+          <p:cNvSpPr/>
+          <p:nvPr/>
+        </p:nvSpPr>
+        <p:spPr>
+          <a:xfrm>
+            <a:off x="8047727" y="3668485"/>
+            <a:ext cx="1408296" cy="1408296"/>
+          </a:xfrm>
+          <a:prstGeom prst="cube">
+            <a:avLst/>
+          </a:prstGeom>
+          <a:solidFill>
+            <a:schemeClr val="accent6">
+              <a:alpha val="44000"/>
+            </a:schemeClr>
+          </a:solidFill>
+          <a:ln>
+            <a:solidFill>
+              <a:schemeClr val="accent6"/>
+            </a:solidFill>
+          </a:ln>
+        </p:spPr>
+        <p:style>
+          <a:lnRef idx="2">
+            <a:schemeClr val="accent1">
+              <a:shade val="50000"/>
+            </a:schemeClr>
+          </a:lnRef>
+          <a:fillRef idx="1">
+            <a:schemeClr val="accent1"/>
+          </a:fillRef>
+          <a:effectRef idx="0">
+            <a:schemeClr val="accent1"/>
+          </a:effectRef>
+          <a:fontRef idx="minor">
+            <a:schemeClr val="lt1"/>
+          </a:fontRef>
+        </p:style>
+        <p:txBody>
+          <a:bodyPr rtlCol="0" anchor="ctr"/>
+          <a:lstStyle/>
+          <a:p>
+            <a:pPr algn="ctr"/>
+            <a:endParaRPr lang="de-DE"/>
+          </a:p>
+        </p:txBody>
+      </p:sp>
+      <p:sp>
+        <p:nvSpPr>
+          <p:cNvPr id="65" name="Cube 64">
+            <a:extLst>
+              <a:ext uri="{FF2B5EF4-FFF2-40B4-BE49-F238E27FC236}">
+                <a16:creationId xmlns:a16="http://schemas.microsoft.com/office/drawing/2014/main" id="{D710C34C-1B13-0E49-9B82-08957BFF41F4}"/>
+              </a:ext>
+            </a:extLst>
+          </p:cNvPr>
+          <p:cNvSpPr/>
+          <p:nvPr/>
+        </p:nvSpPr>
+        <p:spPr>
+          <a:xfrm>
+            <a:off x="9120412" y="3668485"/>
+            <a:ext cx="1408296" cy="1408296"/>
+          </a:xfrm>
+          <a:prstGeom prst="cube">
+            <a:avLst/>
+          </a:prstGeom>
+          <a:solidFill>
+            <a:schemeClr val="accent6">
+              <a:alpha val="44000"/>
+            </a:schemeClr>
+          </a:solidFill>
+          <a:ln>
+            <a:solidFill>
+              <a:schemeClr val="accent6"/>
+            </a:solidFill>
+          </a:ln>
+        </p:spPr>
+        <p:style>
+          <a:lnRef idx="2">
+            <a:schemeClr val="accent1">
+              <a:shade val="50000"/>
+            </a:schemeClr>
+          </a:lnRef>
+          <a:fillRef idx="1">
+            <a:schemeClr val="accent1"/>
+          </a:fillRef>
+          <a:effectRef idx="0">
+            <a:schemeClr val="accent1"/>
+          </a:effectRef>
+          <a:fontRef idx="minor">
+            <a:schemeClr val="lt1"/>
+          </a:fontRef>
+        </p:style>
+        <p:txBody>
+          <a:bodyPr rtlCol="0" anchor="ctr"/>
+          <a:lstStyle/>
+          <a:p>
+            <a:pPr algn="ctr"/>
+            <a:endParaRPr lang="de-DE"/>
+          </a:p>
+        </p:txBody>
+      </p:sp>
+      <p:sp>
+        <p:nvSpPr>
+          <p:cNvPr id="66" name="Cube 65">
+            <a:extLst>
+              <a:ext uri="{FF2B5EF4-FFF2-40B4-BE49-F238E27FC236}">
+                <a16:creationId xmlns:a16="http://schemas.microsoft.com/office/drawing/2014/main" id="{77FA8BD2-ECC3-DC4F-BE63-59356FCCC40F}"/>
+              </a:ext>
+            </a:extLst>
+          </p:cNvPr>
+          <p:cNvSpPr/>
+          <p:nvPr/>
+        </p:nvSpPr>
+        <p:spPr>
+          <a:xfrm>
+            <a:off x="10174846" y="3668485"/>
+            <a:ext cx="1408296" cy="1408296"/>
+          </a:xfrm>
+          <a:prstGeom prst="cube">
+            <a:avLst/>
+          </a:prstGeom>
+          <a:solidFill>
+            <a:schemeClr val="accent6">
+              <a:alpha val="66000"/>
+            </a:schemeClr>
+          </a:solidFill>
+          <a:ln>
+            <a:solidFill>
+              <a:schemeClr val="accent6"/>
+            </a:solidFill>
+          </a:ln>
+        </p:spPr>
+        <p:style>
+          <a:lnRef idx="2">
+            <a:schemeClr val="accent1">
+              <a:shade val="50000"/>
+            </a:schemeClr>
+          </a:lnRef>
+          <a:fillRef idx="1">
+            <a:schemeClr val="accent1"/>
+          </a:fillRef>
+          <a:effectRef idx="0">
+            <a:schemeClr val="accent1"/>
+          </a:effectRef>
+          <a:fontRef idx="minor">
+            <a:schemeClr val="lt1"/>
+          </a:fontRef>
+        </p:style>
+        <p:txBody>
+          <a:bodyPr rtlCol="0" anchor="ctr"/>
+          <a:lstStyle/>
+          <a:p>
+            <a:pPr algn="ctr"/>
+            <a:endParaRPr lang="de-DE"/>
+          </a:p>
+        </p:txBody>
+      </p:sp>
+      <p:sp>
+        <p:nvSpPr>
+          <p:cNvPr id="67" name="Cube 66">
+            <a:extLst>
+              <a:ext uri="{FF2B5EF4-FFF2-40B4-BE49-F238E27FC236}">
+                <a16:creationId xmlns:a16="http://schemas.microsoft.com/office/drawing/2014/main" id="{F0A9BA55-14EC-CB41-9DFF-CC7BAFD8A78F}"/>
+              </a:ext>
+            </a:extLst>
+          </p:cNvPr>
+          <p:cNvSpPr/>
+          <p:nvPr/>
+        </p:nvSpPr>
+        <p:spPr>
+          <a:xfrm>
+            <a:off x="7693869" y="4022047"/>
+            <a:ext cx="1408296" cy="1408296"/>
+          </a:xfrm>
+          <a:prstGeom prst="cube">
+            <a:avLst/>
+          </a:prstGeom>
+          <a:solidFill>
+            <a:schemeClr val="accent6">
+              <a:alpha val="44000"/>
+            </a:schemeClr>
+          </a:solidFill>
+          <a:ln>
+            <a:solidFill>
+              <a:schemeClr val="accent6"/>
+            </a:solidFill>
+          </a:ln>
+        </p:spPr>
+        <p:style>
+          <a:lnRef idx="2">
+            <a:schemeClr val="accent1">
+              <a:shade val="50000"/>
+            </a:schemeClr>
+          </a:lnRef>
+          <a:fillRef idx="1">
+            <a:schemeClr val="accent1"/>
+          </a:fillRef>
+          <a:effectRef idx="0">
+            <a:schemeClr val="accent1"/>
+          </a:effectRef>
+          <a:fontRef idx="minor">
+            <a:schemeClr val="lt1"/>
+          </a:fontRef>
+        </p:style>
+        <p:txBody>
+          <a:bodyPr rtlCol="0" anchor="ctr"/>
+          <a:lstStyle/>
+          <a:p>
+            <a:pPr algn="ctr"/>
+            <a:endParaRPr lang="de-DE"/>
+          </a:p>
+        </p:txBody>
+      </p:sp>
+      <p:sp>
+        <p:nvSpPr>
+          <p:cNvPr id="68" name="Cube 67">
+            <a:extLst>
+              <a:ext uri="{FF2B5EF4-FFF2-40B4-BE49-F238E27FC236}">
+                <a16:creationId xmlns:a16="http://schemas.microsoft.com/office/drawing/2014/main" id="{1A66524D-7412-634E-8B49-C8090602AD43}"/>
+              </a:ext>
+            </a:extLst>
+          </p:cNvPr>
+          <p:cNvSpPr/>
+          <p:nvPr/>
+        </p:nvSpPr>
+        <p:spPr>
+          <a:xfrm>
+            <a:off x="8751302" y="4007374"/>
+            <a:ext cx="1408296" cy="1408296"/>
+          </a:xfrm>
+          <a:prstGeom prst="cube">
+            <a:avLst/>
+          </a:prstGeom>
+          <a:solidFill>
+            <a:schemeClr val="accent6">
+              <a:alpha val="44000"/>
+            </a:schemeClr>
+          </a:solidFill>
+          <a:ln>
+            <a:solidFill>
+              <a:schemeClr val="accent6"/>
+            </a:solidFill>
+          </a:ln>
+        </p:spPr>
+        <p:style>
+          <a:lnRef idx="2">
+            <a:schemeClr val="accent1">
+              <a:shade val="50000"/>
+            </a:schemeClr>
+          </a:lnRef>
+          <a:fillRef idx="1">
+            <a:schemeClr val="accent1"/>
+          </a:fillRef>
+          <a:effectRef idx="0">
+            <a:schemeClr val="accent1"/>
+          </a:effectRef>
+          <a:fontRef idx="minor">
+            <a:schemeClr val="lt1"/>
+          </a:fontRef>
+        </p:style>
+        <p:txBody>
+          <a:bodyPr rtlCol="0" anchor="ctr"/>
+          <a:lstStyle/>
+          <a:p>
+            <a:pPr algn="ctr"/>
+            <a:endParaRPr lang="de-DE"/>
+          </a:p>
+        </p:txBody>
+      </p:sp>
+      <p:sp>
+        <p:nvSpPr>
+          <p:cNvPr id="69" name="Cube 68">
+            <a:extLst>
+              <a:ext uri="{FF2B5EF4-FFF2-40B4-BE49-F238E27FC236}">
+                <a16:creationId xmlns:a16="http://schemas.microsoft.com/office/drawing/2014/main" id="{2A2FD5C3-A836-2B48-B33F-CB78132620F7}"/>
+              </a:ext>
+            </a:extLst>
+          </p:cNvPr>
+          <p:cNvSpPr/>
+          <p:nvPr/>
+        </p:nvSpPr>
+        <p:spPr>
+          <a:xfrm>
+            <a:off x="7352289" y="4346868"/>
+            <a:ext cx="1408296" cy="1408296"/>
+          </a:xfrm>
+          <a:prstGeom prst="cube">
+            <a:avLst/>
+          </a:prstGeom>
+          <a:solidFill>
+            <a:schemeClr val="accent6">
+              <a:alpha val="44000"/>
+            </a:schemeClr>
+          </a:solidFill>
+          <a:ln>
+            <a:solidFill>
+              <a:schemeClr val="accent6"/>
+            </a:solidFill>
+          </a:ln>
+        </p:spPr>
+        <p:style>
+          <a:lnRef idx="2">
+            <a:schemeClr val="accent1">
+              <a:shade val="50000"/>
+            </a:schemeClr>
+          </a:lnRef>
+          <a:fillRef idx="1">
+            <a:schemeClr val="accent1"/>
+          </a:fillRef>
+          <a:effectRef idx="0">
+            <a:schemeClr val="accent1"/>
+          </a:effectRef>
+          <a:fontRef idx="minor">
+            <a:schemeClr val="lt1"/>
+          </a:fontRef>
+        </p:style>
+        <p:txBody>
+          <a:bodyPr rtlCol="0" anchor="ctr"/>
+          <a:lstStyle/>
+          <a:p>
+            <a:pPr algn="ctr"/>
+            <a:endParaRPr lang="de-DE"/>
+          </a:p>
+        </p:txBody>
+      </p:sp>
+      <p:sp>
+        <p:nvSpPr>
+          <p:cNvPr id="70" name="Cube 69">
+            <a:extLst>
+              <a:ext uri="{FF2B5EF4-FFF2-40B4-BE49-F238E27FC236}">
+                <a16:creationId xmlns:a16="http://schemas.microsoft.com/office/drawing/2014/main" id="{EDC03E5C-B413-F746-B919-2BFB8C1AF952}"/>
+              </a:ext>
+            </a:extLst>
+          </p:cNvPr>
+          <p:cNvSpPr/>
+          <p:nvPr/>
+        </p:nvSpPr>
+        <p:spPr>
+          <a:xfrm>
+            <a:off x="8411507" y="4346866"/>
+            <a:ext cx="1408296" cy="1408296"/>
+          </a:xfrm>
+          <a:prstGeom prst="cube">
+            <a:avLst/>
+          </a:prstGeom>
+          <a:solidFill>
+            <a:schemeClr val="accent6">
+              <a:alpha val="44000"/>
+            </a:schemeClr>
+          </a:solidFill>
+          <a:ln>
+            <a:solidFill>
+              <a:schemeClr val="accent6"/>
+            </a:solidFill>
+          </a:ln>
+        </p:spPr>
+        <p:style>
+          <a:lnRef idx="2">
+            <a:schemeClr val="accent1">
+              <a:shade val="50000"/>
+            </a:schemeClr>
+          </a:lnRef>
+          <a:fillRef idx="1">
+            <a:schemeClr val="accent1"/>
+          </a:fillRef>
+          <a:effectRef idx="0">
+            <a:schemeClr val="accent1"/>
+          </a:effectRef>
+          <a:fontRef idx="minor">
+            <a:schemeClr val="lt1"/>
+          </a:fontRef>
+        </p:style>
+        <p:txBody>
+          <a:bodyPr rtlCol="0" anchor="ctr"/>
+          <a:lstStyle/>
+          <a:p>
+            <a:pPr algn="ctr"/>
+            <a:endParaRPr lang="de-DE"/>
+          </a:p>
+        </p:txBody>
+      </p:sp>
+      <p:sp>
+        <p:nvSpPr>
+          <p:cNvPr id="71" name="Cube 70">
+            <a:extLst>
+              <a:ext uri="{FF2B5EF4-FFF2-40B4-BE49-F238E27FC236}">
+                <a16:creationId xmlns:a16="http://schemas.microsoft.com/office/drawing/2014/main" id="{A1BC5F27-B850-F94C-B5BB-5B8AF49A2F60}"/>
+              </a:ext>
+            </a:extLst>
+          </p:cNvPr>
+          <p:cNvSpPr/>
+          <p:nvPr/>
+        </p:nvSpPr>
+        <p:spPr>
+          <a:xfrm>
+            <a:off x="9830870" y="4007979"/>
+            <a:ext cx="1408296" cy="1408296"/>
+          </a:xfrm>
+          <a:prstGeom prst="cube">
+            <a:avLst/>
+          </a:prstGeom>
+          <a:solidFill>
+            <a:schemeClr val="accent6">
+              <a:alpha val="66000"/>
+            </a:schemeClr>
+          </a:solidFill>
+          <a:ln>
+            <a:solidFill>
+              <a:schemeClr val="accent6"/>
+            </a:solidFill>
+          </a:ln>
+        </p:spPr>
+        <p:style>
+          <a:lnRef idx="2">
+            <a:schemeClr val="accent1">
+              <a:shade val="50000"/>
+            </a:schemeClr>
+          </a:lnRef>
+          <a:fillRef idx="1">
+            <a:schemeClr val="accent1"/>
+          </a:fillRef>
+          <a:effectRef idx="0">
+            <a:schemeClr val="accent1"/>
+          </a:effectRef>
+          <a:fontRef idx="minor">
+            <a:schemeClr val="lt1"/>
+          </a:fontRef>
+        </p:style>
+        <p:txBody>
+          <a:bodyPr rtlCol="0" anchor="ctr"/>
+          <a:lstStyle/>
+          <a:p>
+            <a:pPr algn="ctr"/>
+            <a:endParaRPr lang="de-DE"/>
+          </a:p>
+        </p:txBody>
+      </p:sp>
+      <p:sp>
+        <p:nvSpPr>
+          <p:cNvPr id="72" name="Cube 71">
+            <a:extLst>
+              <a:ext uri="{FF2B5EF4-FFF2-40B4-BE49-F238E27FC236}">
+                <a16:creationId xmlns:a16="http://schemas.microsoft.com/office/drawing/2014/main" id="{4C56FCE5-444B-394F-8F96-A7F6C98FA01A}"/>
+              </a:ext>
+            </a:extLst>
+          </p:cNvPr>
+          <p:cNvSpPr/>
+          <p:nvPr/>
+        </p:nvSpPr>
+        <p:spPr>
+          <a:xfrm>
+            <a:off x="9470730" y="4346866"/>
+            <a:ext cx="1408296" cy="1408296"/>
+          </a:xfrm>
+          <a:prstGeom prst="cube">
+            <a:avLst/>
+          </a:prstGeom>
+          <a:solidFill>
+            <a:schemeClr val="accent6">
+              <a:alpha val="44000"/>
+            </a:schemeClr>
+          </a:solidFill>
+          <a:ln>
+            <a:solidFill>
+              <a:schemeClr val="accent6"/>
+            </a:solidFill>
+          </a:ln>
+        </p:spPr>
+        <p:style>
+          <a:lnRef idx="2">
+            <a:schemeClr val="accent1">
+              <a:shade val="50000"/>
+            </a:schemeClr>
+          </a:lnRef>
+          <a:fillRef idx="1">
+            <a:schemeClr val="accent1"/>
+          </a:fillRef>
+          <a:effectRef idx="0">
+            <a:schemeClr val="accent1"/>
+          </a:effectRef>
+          <a:fontRef idx="minor">
+            <a:schemeClr val="lt1"/>
+          </a:fontRef>
+        </p:style>
+        <p:txBody>
+          <a:bodyPr rtlCol="0" anchor="ctr"/>
+          <a:lstStyle/>
+          <a:p>
+            <a:pPr algn="ctr"/>
+            <a:endParaRPr lang="de-DE"/>
+          </a:p>
+        </p:txBody>
+      </p:sp>
+      <p:sp>
+        <p:nvSpPr>
+          <p:cNvPr id="73" name="Cube 72">
+            <a:extLst>
+              <a:ext uri="{FF2B5EF4-FFF2-40B4-BE49-F238E27FC236}">
+                <a16:creationId xmlns:a16="http://schemas.microsoft.com/office/drawing/2014/main" id="{84E4060C-D8C4-6043-A7A5-E8C93FBB56C5}"/>
+              </a:ext>
+            </a:extLst>
+          </p:cNvPr>
+          <p:cNvSpPr/>
+          <p:nvPr/>
+        </p:nvSpPr>
+        <p:spPr>
+          <a:xfrm>
+            <a:off x="8045381" y="2639198"/>
+            <a:ext cx="1408296" cy="1408296"/>
+          </a:xfrm>
+          <a:prstGeom prst="cube">
+            <a:avLst/>
+          </a:prstGeom>
+          <a:solidFill>
+            <a:schemeClr val="accent6">
+              <a:alpha val="44000"/>
+            </a:schemeClr>
+          </a:solidFill>
+          <a:ln>
+            <a:solidFill>
+              <a:schemeClr val="accent6"/>
+            </a:solidFill>
+          </a:ln>
+        </p:spPr>
+        <p:style>
+          <a:lnRef idx="2">
+            <a:schemeClr val="accent1">
+              <a:shade val="50000"/>
+            </a:schemeClr>
+          </a:lnRef>
+          <a:fillRef idx="1">
+            <a:schemeClr val="accent1"/>
+          </a:fillRef>
+          <a:effectRef idx="0">
+            <a:schemeClr val="accent1"/>
+          </a:effectRef>
+          <a:fontRef idx="minor">
+            <a:schemeClr val="lt1"/>
+          </a:fontRef>
+        </p:style>
+        <p:txBody>
+          <a:bodyPr rtlCol="0" anchor="ctr"/>
+          <a:lstStyle/>
+          <a:p>
+            <a:pPr algn="ctr"/>
+            <a:endParaRPr lang="de-DE"/>
+          </a:p>
+        </p:txBody>
+      </p:sp>
+      <p:sp>
+        <p:nvSpPr>
+          <p:cNvPr id="74" name="Cube 73">
+            <a:extLst>
+              <a:ext uri="{FF2B5EF4-FFF2-40B4-BE49-F238E27FC236}">
+                <a16:creationId xmlns:a16="http://schemas.microsoft.com/office/drawing/2014/main" id="{0D49B2EB-1052-8D48-BFC4-07CC50268AF5}"/>
+              </a:ext>
+            </a:extLst>
+          </p:cNvPr>
+          <p:cNvSpPr/>
+          <p:nvPr/>
+        </p:nvSpPr>
+        <p:spPr>
+          <a:xfrm>
+            <a:off x="9118066" y="2639198"/>
+            <a:ext cx="1408296" cy="1408296"/>
+          </a:xfrm>
+          <a:prstGeom prst="cube">
+            <a:avLst/>
+          </a:prstGeom>
+          <a:solidFill>
+            <a:schemeClr val="accent6">
+              <a:alpha val="44000"/>
+            </a:schemeClr>
+          </a:solidFill>
+          <a:ln>
+            <a:solidFill>
+              <a:schemeClr val="accent6"/>
+            </a:solidFill>
+          </a:ln>
+        </p:spPr>
+        <p:style>
+          <a:lnRef idx="2">
+            <a:schemeClr val="accent1">
+              <a:shade val="50000"/>
+            </a:schemeClr>
+          </a:lnRef>
+          <a:fillRef idx="1">
+            <a:schemeClr val="accent1"/>
+          </a:fillRef>
+          <a:effectRef idx="0">
+            <a:schemeClr val="accent1"/>
+          </a:effectRef>
+          <a:fontRef idx="minor">
+            <a:schemeClr val="lt1"/>
+          </a:fontRef>
+        </p:style>
+        <p:txBody>
+          <a:bodyPr rtlCol="0" anchor="ctr"/>
+          <a:lstStyle/>
+          <a:p>
+            <a:pPr algn="ctr"/>
+            <a:endParaRPr lang="de-DE"/>
+          </a:p>
+        </p:txBody>
+      </p:sp>
+      <p:sp>
+        <p:nvSpPr>
+          <p:cNvPr id="75" name="Cube 74">
+            <a:extLst>
+              <a:ext uri="{FF2B5EF4-FFF2-40B4-BE49-F238E27FC236}">
+                <a16:creationId xmlns:a16="http://schemas.microsoft.com/office/drawing/2014/main" id="{E67E9A31-06F9-CD4E-B5DC-7BEACDA597DB}"/>
+              </a:ext>
+            </a:extLst>
+          </p:cNvPr>
+          <p:cNvSpPr/>
+          <p:nvPr/>
+        </p:nvSpPr>
+        <p:spPr>
+          <a:xfrm>
+            <a:off x="10172500" y="2639198"/>
+            <a:ext cx="1408296" cy="1408296"/>
+          </a:xfrm>
+          <a:prstGeom prst="cube">
+            <a:avLst/>
+          </a:prstGeom>
+          <a:solidFill>
+            <a:schemeClr val="accent6">
+              <a:alpha val="69000"/>
+            </a:schemeClr>
+          </a:solidFill>
+          <a:ln>
+            <a:solidFill>
+              <a:schemeClr val="accent6"/>
+            </a:solidFill>
+          </a:ln>
+        </p:spPr>
+        <p:style>
+          <a:lnRef idx="2">
+            <a:schemeClr val="accent1">
+              <a:shade val="50000"/>
+            </a:schemeClr>
+          </a:lnRef>
+          <a:fillRef idx="1">
+            <a:schemeClr val="accent1"/>
+          </a:fillRef>
+          <a:effectRef idx="0">
+            <a:schemeClr val="accent1"/>
+          </a:effectRef>
+          <a:fontRef idx="minor">
+            <a:schemeClr val="lt1"/>
+          </a:fontRef>
+        </p:style>
+        <p:txBody>
+          <a:bodyPr rtlCol="0" anchor="ctr"/>
+          <a:lstStyle/>
+          <a:p>
+            <a:pPr algn="ctr"/>
+            <a:endParaRPr lang="de-DE"/>
+          </a:p>
+        </p:txBody>
+      </p:sp>
+      <p:sp>
+        <p:nvSpPr>
+          <p:cNvPr id="76" name="Cube 75">
+            <a:extLst>
+              <a:ext uri="{FF2B5EF4-FFF2-40B4-BE49-F238E27FC236}">
+                <a16:creationId xmlns:a16="http://schemas.microsoft.com/office/drawing/2014/main" id="{0177BDEE-9E59-3A4B-A469-F81312095315}"/>
+              </a:ext>
+            </a:extLst>
+          </p:cNvPr>
+          <p:cNvSpPr/>
+          <p:nvPr/>
+        </p:nvSpPr>
+        <p:spPr>
+          <a:xfrm>
+            <a:off x="7691523" y="2992760"/>
+            <a:ext cx="1408296" cy="1408296"/>
+          </a:xfrm>
+          <a:prstGeom prst="cube">
+            <a:avLst/>
+          </a:prstGeom>
+          <a:solidFill>
+            <a:schemeClr val="accent6">
+              <a:alpha val="44000"/>
+            </a:schemeClr>
+          </a:solidFill>
+          <a:ln>
+            <a:solidFill>
+              <a:schemeClr val="accent6"/>
+            </a:solidFill>
+          </a:ln>
+        </p:spPr>
+        <p:style>
+          <a:lnRef idx="2">
+            <a:schemeClr val="accent1">
+              <a:shade val="50000"/>
+            </a:schemeClr>
+          </a:lnRef>
+          <a:fillRef idx="1">
+            <a:schemeClr val="accent1"/>
+          </a:fillRef>
+          <a:effectRef idx="0">
+            <a:schemeClr val="accent1"/>
+          </a:effectRef>
+          <a:fontRef idx="minor">
+            <a:schemeClr val="lt1"/>
+          </a:fontRef>
+        </p:style>
+        <p:txBody>
+          <a:bodyPr rtlCol="0" anchor="ctr"/>
+          <a:lstStyle/>
+          <a:p>
+            <a:pPr algn="ctr"/>
+            <a:endParaRPr lang="de-DE"/>
+          </a:p>
+        </p:txBody>
+      </p:sp>
+      <p:sp>
+        <p:nvSpPr>
+          <p:cNvPr id="77" name="Cube 76">
+            <a:extLst>
+              <a:ext uri="{FF2B5EF4-FFF2-40B4-BE49-F238E27FC236}">
+                <a16:creationId xmlns:a16="http://schemas.microsoft.com/office/drawing/2014/main" id="{5D155865-1AE9-CC45-A330-10A2D96E52DA}"/>
+              </a:ext>
+            </a:extLst>
+          </p:cNvPr>
+          <p:cNvSpPr/>
+          <p:nvPr/>
+        </p:nvSpPr>
+        <p:spPr>
+          <a:xfrm>
+            <a:off x="8748956" y="2978087"/>
+            <a:ext cx="1408296" cy="1408296"/>
+          </a:xfrm>
+          <a:prstGeom prst="cube">
+            <a:avLst/>
+          </a:prstGeom>
+          <a:solidFill>
+            <a:schemeClr val="accent1"/>
+          </a:solidFill>
+          <a:ln>
+            <a:solidFill>
+              <a:schemeClr val="accent6"/>
+            </a:solidFill>
+          </a:ln>
+        </p:spPr>
+        <p:style>
+          <a:lnRef idx="2">
+            <a:schemeClr val="accent1">
+              <a:shade val="50000"/>
+            </a:schemeClr>
+          </a:lnRef>
+          <a:fillRef idx="1">
+            <a:schemeClr val="accent1"/>
+          </a:fillRef>
+          <a:effectRef idx="0">
+            <a:schemeClr val="accent1"/>
+          </a:effectRef>
+          <a:fontRef idx="minor">
+            <a:schemeClr val="lt1"/>
+          </a:fontRef>
+        </p:style>
+        <p:txBody>
+          <a:bodyPr rtlCol="0" anchor="ctr"/>
+          <a:lstStyle/>
+          <a:p>
+            <a:pPr algn="ctr"/>
+            <a:endParaRPr lang="de-DE"/>
+          </a:p>
+        </p:txBody>
+      </p:sp>
+      <p:sp>
+        <p:nvSpPr>
+          <p:cNvPr id="78" name="Cube 77">
+            <a:extLst>
+              <a:ext uri="{FF2B5EF4-FFF2-40B4-BE49-F238E27FC236}">
+                <a16:creationId xmlns:a16="http://schemas.microsoft.com/office/drawing/2014/main" id="{19CE6BB3-8FF1-A44D-BE87-9B5A7629ADCD}"/>
+              </a:ext>
+            </a:extLst>
+          </p:cNvPr>
+          <p:cNvSpPr/>
+          <p:nvPr/>
+        </p:nvSpPr>
+        <p:spPr>
+          <a:xfrm>
+            <a:off x="7349943" y="3317581"/>
+            <a:ext cx="1408296" cy="1408296"/>
+          </a:xfrm>
+          <a:prstGeom prst="cube">
+            <a:avLst/>
+          </a:prstGeom>
+          <a:solidFill>
+            <a:schemeClr val="accent6">
+              <a:alpha val="44000"/>
+            </a:schemeClr>
+          </a:solidFill>
+          <a:ln>
+            <a:solidFill>
+              <a:schemeClr val="accent6"/>
+            </a:solidFill>
+          </a:ln>
+        </p:spPr>
+        <p:style>
+          <a:lnRef idx="2">
+            <a:schemeClr val="accent1">
+              <a:shade val="50000"/>
+            </a:schemeClr>
+          </a:lnRef>
+          <a:fillRef idx="1">
+            <a:schemeClr val="accent1"/>
+          </a:fillRef>
+          <a:effectRef idx="0">
+            <a:schemeClr val="accent1"/>
+          </a:effectRef>
+          <a:fontRef idx="minor">
+            <a:schemeClr val="lt1"/>
+          </a:fontRef>
+        </p:style>
+        <p:txBody>
+          <a:bodyPr rtlCol="0" anchor="ctr"/>
+          <a:lstStyle/>
+          <a:p>
+            <a:pPr algn="ctr"/>
+            <a:endParaRPr lang="de-DE"/>
+          </a:p>
+        </p:txBody>
+      </p:sp>
+      <p:sp>
+        <p:nvSpPr>
+          <p:cNvPr id="79" name="Cube 78">
+            <a:extLst>
+              <a:ext uri="{FF2B5EF4-FFF2-40B4-BE49-F238E27FC236}">
+                <a16:creationId xmlns:a16="http://schemas.microsoft.com/office/drawing/2014/main" id="{DED801CB-148B-D146-889E-BECD92B1F693}"/>
+              </a:ext>
+            </a:extLst>
+          </p:cNvPr>
+          <p:cNvSpPr/>
+          <p:nvPr/>
+        </p:nvSpPr>
+        <p:spPr>
+          <a:xfrm>
+            <a:off x="8409161" y="3317579"/>
+            <a:ext cx="1408296" cy="1408296"/>
+          </a:xfrm>
+          <a:prstGeom prst="cube">
+            <a:avLst/>
+          </a:prstGeom>
+          <a:solidFill>
+            <a:schemeClr val="accent6">
+              <a:alpha val="44000"/>
+            </a:schemeClr>
+          </a:solidFill>
+          <a:ln>
+            <a:solidFill>
+              <a:schemeClr val="accent6"/>
+            </a:solidFill>
+          </a:ln>
+        </p:spPr>
+        <p:style>
+          <a:lnRef idx="2">
+            <a:schemeClr val="accent1">
+              <a:shade val="50000"/>
+            </a:schemeClr>
+          </a:lnRef>
+          <a:fillRef idx="1">
+            <a:schemeClr val="accent1"/>
+          </a:fillRef>
+          <a:effectRef idx="0">
+            <a:schemeClr val="accent1"/>
+          </a:effectRef>
+          <a:fontRef idx="minor">
+            <a:schemeClr val="lt1"/>
+          </a:fontRef>
+        </p:style>
+        <p:txBody>
+          <a:bodyPr rtlCol="0" anchor="ctr"/>
+          <a:lstStyle/>
+          <a:p>
+            <a:pPr algn="ctr"/>
+            <a:endParaRPr lang="de-DE"/>
+          </a:p>
+        </p:txBody>
+      </p:sp>
+      <p:sp>
+        <p:nvSpPr>
+          <p:cNvPr id="80" name="Cube 79">
+            <a:extLst>
+              <a:ext uri="{FF2B5EF4-FFF2-40B4-BE49-F238E27FC236}">
+                <a16:creationId xmlns:a16="http://schemas.microsoft.com/office/drawing/2014/main" id="{44E2B40F-FE41-3343-9491-3B5EC235A6B2}"/>
+              </a:ext>
+            </a:extLst>
+          </p:cNvPr>
+          <p:cNvSpPr/>
+          <p:nvPr/>
+        </p:nvSpPr>
+        <p:spPr>
+          <a:xfrm>
+            <a:off x="9828524" y="2978692"/>
+            <a:ext cx="1408296" cy="1408296"/>
+          </a:xfrm>
+          <a:prstGeom prst="cube">
+            <a:avLst/>
+          </a:prstGeom>
+          <a:solidFill>
+            <a:schemeClr val="accent6">
+              <a:alpha val="44000"/>
+            </a:schemeClr>
+          </a:solidFill>
+          <a:ln>
+            <a:solidFill>
+              <a:schemeClr val="accent6"/>
+            </a:solidFill>
+          </a:ln>
+        </p:spPr>
+        <p:style>
+          <a:lnRef idx="2">
+            <a:schemeClr val="accent1">
+              <a:shade val="50000"/>
+            </a:schemeClr>
+          </a:lnRef>
+          <a:fillRef idx="1">
+            <a:schemeClr val="accent1"/>
+          </a:fillRef>
+          <a:effectRef idx="0">
+            <a:schemeClr val="accent1"/>
+          </a:effectRef>
+          <a:fontRef idx="minor">
+            <a:schemeClr val="lt1"/>
+          </a:fontRef>
+        </p:style>
+        <p:txBody>
+          <a:bodyPr rtlCol="0" anchor="ctr"/>
+          <a:lstStyle/>
+          <a:p>
+            <a:pPr algn="ctr"/>
+            <a:endParaRPr lang="de-DE"/>
+          </a:p>
+        </p:txBody>
+      </p:sp>
+      <p:sp>
+        <p:nvSpPr>
+          <p:cNvPr id="81" name="Cube 80">
+            <a:extLst>
+              <a:ext uri="{FF2B5EF4-FFF2-40B4-BE49-F238E27FC236}">
+                <a16:creationId xmlns:a16="http://schemas.microsoft.com/office/drawing/2014/main" id="{29CB1321-1D2F-6A43-831E-C87BCE644BD0}"/>
+              </a:ext>
+            </a:extLst>
+          </p:cNvPr>
+          <p:cNvSpPr/>
+          <p:nvPr/>
+        </p:nvSpPr>
+        <p:spPr>
+          <a:xfrm>
+            <a:off x="9468384" y="3317579"/>
+            <a:ext cx="1408296" cy="1408296"/>
+          </a:xfrm>
+          <a:prstGeom prst="cube">
+            <a:avLst/>
+          </a:prstGeom>
+          <a:solidFill>
+            <a:schemeClr val="accent6">
+              <a:alpha val="44000"/>
+            </a:schemeClr>
+          </a:solidFill>
+          <a:ln>
+            <a:solidFill>
+              <a:schemeClr val="accent6"/>
+            </a:solidFill>
+          </a:ln>
+        </p:spPr>
+        <p:style>
+          <a:lnRef idx="2">
+            <a:schemeClr val="accent1">
+              <a:shade val="50000"/>
+            </a:schemeClr>
+          </a:lnRef>
+          <a:fillRef idx="1">
+            <a:schemeClr val="accent1"/>
+          </a:fillRef>
+          <a:effectRef idx="0">
+            <a:schemeClr val="accent1"/>
+          </a:effectRef>
+          <a:fontRef idx="minor">
+            <a:schemeClr val="lt1"/>
+          </a:fontRef>
+        </p:style>
+        <p:txBody>
+          <a:bodyPr rtlCol="0" anchor="ctr"/>
+          <a:lstStyle/>
+          <a:p>
+            <a:pPr algn="ctr"/>
+            <a:endParaRPr lang="de-DE"/>
+          </a:p>
+        </p:txBody>
+      </p:sp>
+      <p:sp>
+        <p:nvSpPr>
+          <p:cNvPr id="82" name="Cube 81">
+            <a:extLst>
+              <a:ext uri="{FF2B5EF4-FFF2-40B4-BE49-F238E27FC236}">
+                <a16:creationId xmlns:a16="http://schemas.microsoft.com/office/drawing/2014/main" id="{10364DF1-ACAF-B144-B14D-B220828F6009}"/>
+              </a:ext>
+            </a:extLst>
+          </p:cNvPr>
+          <p:cNvSpPr/>
+          <p:nvPr/>
+        </p:nvSpPr>
+        <p:spPr>
+          <a:xfrm>
+            <a:off x="8044169" y="1570640"/>
+            <a:ext cx="1408296" cy="1408296"/>
+          </a:xfrm>
+          <a:prstGeom prst="cube">
+            <a:avLst/>
+          </a:prstGeom>
+          <a:solidFill>
+            <a:schemeClr val="accent6">
+              <a:alpha val="80000"/>
+            </a:schemeClr>
+          </a:solidFill>
+          <a:ln>
+            <a:solidFill>
+              <a:schemeClr val="accent6"/>
+            </a:solidFill>
+          </a:ln>
+        </p:spPr>
+        <p:style>
+          <a:lnRef idx="2">
+            <a:schemeClr val="accent1">
+              <a:shade val="50000"/>
+            </a:schemeClr>
+          </a:lnRef>
+          <a:fillRef idx="1">
+            <a:schemeClr val="accent1"/>
+          </a:fillRef>
+          <a:effectRef idx="0">
+            <a:schemeClr val="accent1"/>
+          </a:effectRef>
+          <a:fontRef idx="minor">
+            <a:schemeClr val="lt1"/>
+          </a:fontRef>
+        </p:style>
+        <p:txBody>
+          <a:bodyPr rtlCol="0" anchor="ctr"/>
+          <a:lstStyle/>
+          <a:p>
+            <a:pPr algn="ctr"/>
+            <a:endParaRPr lang="de-DE"/>
+          </a:p>
+        </p:txBody>
+      </p:sp>
+      <p:sp>
+        <p:nvSpPr>
+          <p:cNvPr id="83" name="Cube 82">
+            <a:extLst>
+              <a:ext uri="{FF2B5EF4-FFF2-40B4-BE49-F238E27FC236}">
+                <a16:creationId xmlns:a16="http://schemas.microsoft.com/office/drawing/2014/main" id="{DFCDF646-4D56-214B-8B58-A19EB3D20300}"/>
+              </a:ext>
+            </a:extLst>
+          </p:cNvPr>
+          <p:cNvSpPr/>
+          <p:nvPr/>
+        </p:nvSpPr>
+        <p:spPr>
+          <a:xfrm>
+            <a:off x="9116854" y="1570640"/>
+            <a:ext cx="1408296" cy="1408296"/>
+          </a:xfrm>
+          <a:prstGeom prst="cube">
+            <a:avLst/>
+          </a:prstGeom>
+          <a:solidFill>
+            <a:schemeClr val="accent6">
+              <a:alpha val="80000"/>
+            </a:schemeClr>
+          </a:solidFill>
+          <a:ln>
+            <a:solidFill>
+              <a:schemeClr val="accent6"/>
+            </a:solidFill>
+          </a:ln>
+        </p:spPr>
+        <p:style>
+          <a:lnRef idx="2">
+            <a:schemeClr val="accent1">
+              <a:shade val="50000"/>
+            </a:schemeClr>
+          </a:lnRef>
+          <a:fillRef idx="1">
+            <a:schemeClr val="accent1"/>
+          </a:fillRef>
+          <a:effectRef idx="0">
+            <a:schemeClr val="accent1"/>
+          </a:effectRef>
+          <a:fontRef idx="minor">
+            <a:schemeClr val="lt1"/>
+          </a:fontRef>
+        </p:style>
+        <p:txBody>
+          <a:bodyPr rtlCol="0" anchor="ctr"/>
+          <a:lstStyle/>
+          <a:p>
+            <a:pPr algn="ctr"/>
+            <a:endParaRPr lang="de-DE"/>
+          </a:p>
+        </p:txBody>
+      </p:sp>
+      <p:sp>
+        <p:nvSpPr>
+          <p:cNvPr id="84" name="Cube 83">
+            <a:extLst>
+              <a:ext uri="{FF2B5EF4-FFF2-40B4-BE49-F238E27FC236}">
+                <a16:creationId xmlns:a16="http://schemas.microsoft.com/office/drawing/2014/main" id="{1FC0C069-DB06-2D4C-9CB2-6374DD108706}"/>
+              </a:ext>
+            </a:extLst>
+          </p:cNvPr>
+          <p:cNvSpPr/>
+          <p:nvPr/>
+        </p:nvSpPr>
+        <p:spPr>
+          <a:xfrm>
+            <a:off x="10171288" y="1570640"/>
+            <a:ext cx="1408296" cy="1408296"/>
+          </a:xfrm>
+          <a:prstGeom prst="cube">
+            <a:avLst/>
+          </a:prstGeom>
+          <a:solidFill>
+            <a:schemeClr val="accent6">
+              <a:alpha val="80000"/>
+            </a:schemeClr>
+          </a:solidFill>
+          <a:ln>
+            <a:solidFill>
+              <a:schemeClr val="accent6"/>
+            </a:solidFill>
+          </a:ln>
+        </p:spPr>
+        <p:style>
+          <a:lnRef idx="2">
+            <a:schemeClr val="accent1">
+              <a:shade val="50000"/>
+            </a:schemeClr>
+          </a:lnRef>
+          <a:fillRef idx="1">
+            <a:schemeClr val="accent1"/>
+          </a:fillRef>
+          <a:effectRef idx="0">
+            <a:schemeClr val="accent1"/>
+          </a:effectRef>
+          <a:fontRef idx="minor">
+            <a:schemeClr val="lt1"/>
+          </a:fontRef>
+        </p:style>
+        <p:txBody>
+          <a:bodyPr rtlCol="0" anchor="ctr"/>
+          <a:lstStyle/>
+          <a:p>
+            <a:pPr algn="ctr"/>
+            <a:endParaRPr lang="de-DE"/>
+          </a:p>
+        </p:txBody>
+      </p:sp>
+      <p:sp>
+        <p:nvSpPr>
+          <p:cNvPr id="85" name="Cube 84">
+            <a:extLst>
+              <a:ext uri="{FF2B5EF4-FFF2-40B4-BE49-F238E27FC236}">
+                <a16:creationId xmlns:a16="http://schemas.microsoft.com/office/drawing/2014/main" id="{C8A4189A-4AE5-E042-AECF-814DA5F66A43}"/>
+              </a:ext>
+            </a:extLst>
+          </p:cNvPr>
+          <p:cNvSpPr/>
+          <p:nvPr/>
+        </p:nvSpPr>
+        <p:spPr>
+          <a:xfrm>
+            <a:off x="7690311" y="1924202"/>
+            <a:ext cx="1408296" cy="1408296"/>
+          </a:xfrm>
+          <a:prstGeom prst="cube">
+            <a:avLst/>
+          </a:prstGeom>
+          <a:solidFill>
+            <a:schemeClr val="accent6">
+              <a:alpha val="44000"/>
+            </a:schemeClr>
+          </a:solidFill>
+          <a:ln>
+            <a:solidFill>
+              <a:schemeClr val="accent6"/>
+            </a:solidFill>
+          </a:ln>
+        </p:spPr>
+        <p:style>
+          <a:lnRef idx="2">
+            <a:schemeClr val="accent1">
+              <a:shade val="50000"/>
+            </a:schemeClr>
+          </a:lnRef>
+          <a:fillRef idx="1">
+            <a:schemeClr val="accent1"/>
+          </a:fillRef>
+          <a:effectRef idx="0">
+            <a:schemeClr val="accent1"/>
+          </a:effectRef>
+          <a:fontRef idx="minor">
+            <a:schemeClr val="lt1"/>
+          </a:fontRef>
+        </p:style>
+        <p:txBody>
+          <a:bodyPr rtlCol="0" anchor="ctr"/>
+          <a:lstStyle/>
+          <a:p>
+            <a:pPr algn="ctr"/>
+            <a:endParaRPr lang="de-DE"/>
+          </a:p>
+        </p:txBody>
+      </p:sp>
+      <p:sp>
+        <p:nvSpPr>
+          <p:cNvPr id="86" name="Cube 85">
+            <a:extLst>
+              <a:ext uri="{FF2B5EF4-FFF2-40B4-BE49-F238E27FC236}">
+                <a16:creationId xmlns:a16="http://schemas.microsoft.com/office/drawing/2014/main" id="{A2765158-D52F-114F-88EA-D8D5E61B5D13}"/>
+              </a:ext>
+            </a:extLst>
+          </p:cNvPr>
+          <p:cNvSpPr/>
+          <p:nvPr/>
+        </p:nvSpPr>
+        <p:spPr>
+          <a:xfrm>
+            <a:off x="8747744" y="1909529"/>
+            <a:ext cx="1408296" cy="1408296"/>
+          </a:xfrm>
+          <a:prstGeom prst="cube">
+            <a:avLst/>
+          </a:prstGeom>
+          <a:solidFill>
+            <a:schemeClr val="accent6">
+              <a:alpha val="44000"/>
+            </a:schemeClr>
+          </a:solidFill>
+          <a:ln>
+            <a:solidFill>
+              <a:schemeClr val="accent6"/>
+            </a:solidFill>
+          </a:ln>
+        </p:spPr>
+        <p:style>
+          <a:lnRef idx="2">
+            <a:schemeClr val="accent1">
+              <a:shade val="50000"/>
+            </a:schemeClr>
+          </a:lnRef>
+          <a:fillRef idx="1">
+            <a:schemeClr val="accent1"/>
+          </a:fillRef>
+          <a:effectRef idx="0">
+            <a:schemeClr val="accent1"/>
+          </a:effectRef>
+          <a:fontRef idx="minor">
+            <a:schemeClr val="lt1"/>
+          </a:fontRef>
+        </p:style>
+        <p:txBody>
+          <a:bodyPr rtlCol="0" anchor="ctr"/>
+          <a:lstStyle/>
+          <a:p>
+            <a:pPr algn="ctr"/>
+            <a:endParaRPr lang="de-DE"/>
+          </a:p>
+        </p:txBody>
+      </p:sp>
+      <p:sp>
+        <p:nvSpPr>
+          <p:cNvPr id="87" name="Cube 86">
+            <a:extLst>
+              <a:ext uri="{FF2B5EF4-FFF2-40B4-BE49-F238E27FC236}">
+                <a16:creationId xmlns:a16="http://schemas.microsoft.com/office/drawing/2014/main" id="{6272E8FE-324F-C945-8588-A9E6E6BA15FE}"/>
+              </a:ext>
+            </a:extLst>
+          </p:cNvPr>
+          <p:cNvSpPr/>
+          <p:nvPr/>
+        </p:nvSpPr>
+        <p:spPr>
+          <a:xfrm>
+            <a:off x="7348731" y="2249023"/>
+            <a:ext cx="1408296" cy="1408296"/>
+          </a:xfrm>
+          <a:prstGeom prst="cube">
+            <a:avLst/>
+          </a:prstGeom>
+          <a:solidFill>
+            <a:schemeClr val="accent6">
+              <a:alpha val="44000"/>
+            </a:schemeClr>
+          </a:solidFill>
+          <a:ln>
+            <a:solidFill>
+              <a:schemeClr val="accent6"/>
+            </a:solidFill>
+          </a:ln>
+        </p:spPr>
+        <p:style>
+          <a:lnRef idx="2">
+            <a:schemeClr val="accent1">
+              <a:shade val="50000"/>
+            </a:schemeClr>
+          </a:lnRef>
+          <a:fillRef idx="1">
+            <a:schemeClr val="accent1"/>
+          </a:fillRef>
+          <a:effectRef idx="0">
+            <a:schemeClr val="accent1"/>
+          </a:effectRef>
+          <a:fontRef idx="minor">
+            <a:schemeClr val="lt1"/>
+          </a:fontRef>
+        </p:style>
+        <p:txBody>
+          <a:bodyPr rtlCol="0" anchor="ctr"/>
+          <a:lstStyle/>
+          <a:p>
+            <a:pPr algn="ctr"/>
+            <a:endParaRPr lang="de-DE"/>
+          </a:p>
+        </p:txBody>
+      </p:sp>
+      <p:sp>
+        <p:nvSpPr>
+          <p:cNvPr id="88" name="Cube 87">
+            <a:extLst>
+              <a:ext uri="{FF2B5EF4-FFF2-40B4-BE49-F238E27FC236}">
+                <a16:creationId xmlns:a16="http://schemas.microsoft.com/office/drawing/2014/main" id="{2A641813-D4C5-3F46-9A30-E71D504FE5FF}"/>
+              </a:ext>
+            </a:extLst>
+          </p:cNvPr>
+          <p:cNvSpPr/>
+          <p:nvPr/>
+        </p:nvSpPr>
+        <p:spPr>
+          <a:xfrm>
+            <a:off x="8407949" y="2249021"/>
+            <a:ext cx="1408296" cy="1408296"/>
+          </a:xfrm>
+          <a:prstGeom prst="cube">
+            <a:avLst/>
+          </a:prstGeom>
+          <a:solidFill>
+            <a:schemeClr val="accent6">
+              <a:alpha val="44000"/>
+            </a:schemeClr>
+          </a:solidFill>
+          <a:ln>
+            <a:solidFill>
+              <a:schemeClr val="accent6"/>
+            </a:solidFill>
+          </a:ln>
+        </p:spPr>
+        <p:style>
+          <a:lnRef idx="2">
+            <a:schemeClr val="accent1">
+              <a:shade val="50000"/>
+            </a:schemeClr>
+          </a:lnRef>
+          <a:fillRef idx="1">
+            <a:schemeClr val="accent1"/>
+          </a:fillRef>
+          <a:effectRef idx="0">
+            <a:schemeClr val="accent1"/>
+          </a:effectRef>
+          <a:fontRef idx="minor">
+            <a:schemeClr val="lt1"/>
+          </a:fontRef>
+        </p:style>
+        <p:txBody>
+          <a:bodyPr rtlCol="0" anchor="ctr"/>
+          <a:lstStyle/>
+          <a:p>
+            <a:pPr algn="ctr"/>
+            <a:endParaRPr lang="de-DE"/>
+          </a:p>
+        </p:txBody>
+      </p:sp>
+      <p:sp>
+        <p:nvSpPr>
+          <p:cNvPr id="89" name="Cube 88">
+            <a:extLst>
+              <a:ext uri="{FF2B5EF4-FFF2-40B4-BE49-F238E27FC236}">
+                <a16:creationId xmlns:a16="http://schemas.microsoft.com/office/drawing/2014/main" id="{68D9A5F4-36FB-1144-9293-8737183CA7E1}"/>
+              </a:ext>
+            </a:extLst>
+          </p:cNvPr>
+          <p:cNvSpPr/>
+          <p:nvPr/>
+        </p:nvSpPr>
+        <p:spPr>
+          <a:xfrm>
+            <a:off x="9827312" y="1910134"/>
+            <a:ext cx="1408296" cy="1408296"/>
+          </a:xfrm>
+          <a:prstGeom prst="cube">
+            <a:avLst/>
+          </a:prstGeom>
+          <a:solidFill>
+            <a:schemeClr val="accent6">
+              <a:alpha val="44000"/>
+            </a:schemeClr>
+          </a:solidFill>
+          <a:ln>
+            <a:solidFill>
+              <a:schemeClr val="accent6"/>
+            </a:solidFill>
+          </a:ln>
+        </p:spPr>
+        <p:style>
+          <a:lnRef idx="2">
+            <a:schemeClr val="accent1">
+              <a:shade val="50000"/>
+            </a:schemeClr>
+          </a:lnRef>
+          <a:fillRef idx="1">
+            <a:schemeClr val="accent1"/>
+          </a:fillRef>
+          <a:effectRef idx="0">
+            <a:schemeClr val="accent1"/>
+          </a:effectRef>
+          <a:fontRef idx="minor">
+            <a:schemeClr val="lt1"/>
+          </a:fontRef>
+        </p:style>
+        <p:txBody>
+          <a:bodyPr rtlCol="0" anchor="ctr"/>
+          <a:lstStyle/>
+          <a:p>
+            <a:pPr algn="ctr"/>
+            <a:endParaRPr lang="de-DE"/>
+          </a:p>
+        </p:txBody>
+      </p:sp>
+      <p:sp>
+        <p:nvSpPr>
+          <p:cNvPr id="90" name="Cube 89">
+            <a:extLst>
+              <a:ext uri="{FF2B5EF4-FFF2-40B4-BE49-F238E27FC236}">
+                <a16:creationId xmlns:a16="http://schemas.microsoft.com/office/drawing/2014/main" id="{FF19B523-6526-864E-95FF-21619AFFF093}"/>
+              </a:ext>
+            </a:extLst>
+          </p:cNvPr>
+          <p:cNvSpPr/>
+          <p:nvPr/>
+        </p:nvSpPr>
+        <p:spPr>
+          <a:xfrm>
+            <a:off x="9467172" y="2249021"/>
+            <a:ext cx="1408296" cy="1408296"/>
+          </a:xfrm>
+          <a:prstGeom prst="cube">
+            <a:avLst/>
+          </a:prstGeom>
+          <a:solidFill>
+            <a:schemeClr val="accent6">
+              <a:alpha val="44000"/>
+            </a:schemeClr>
+          </a:solidFill>
+          <a:ln>
+            <a:solidFill>
+              <a:schemeClr val="accent6"/>
+            </a:solidFill>
+          </a:ln>
+        </p:spPr>
+        <p:style>
+          <a:lnRef idx="2">
+            <a:schemeClr val="accent1">
+              <a:shade val="50000"/>
+            </a:schemeClr>
+          </a:lnRef>
+          <a:fillRef idx="1">
+            <a:schemeClr val="accent1"/>
+          </a:fillRef>
+          <a:effectRef idx="0">
+            <a:schemeClr val="accent1"/>
+          </a:effectRef>
+          <a:fontRef idx="minor">
+            <a:schemeClr val="lt1"/>
+          </a:fontRef>
+        </p:style>
+        <p:txBody>
+          <a:bodyPr rtlCol="0" anchor="ctr"/>
+          <a:lstStyle/>
+          <a:p>
+            <a:pPr algn="ctr"/>
+            <a:endParaRPr lang="de-DE"/>
+          </a:p>
+        </p:txBody>
+      </p:sp>
+      <p:sp>
+        <p:nvSpPr>
+          <p:cNvPr id="6" name="TextBox 5">
+            <a:extLst>
+              <a:ext uri="{FF2B5EF4-FFF2-40B4-BE49-F238E27FC236}">
+                <a16:creationId xmlns:a16="http://schemas.microsoft.com/office/drawing/2014/main" id="{EA849C99-188F-0644-B372-2A2456A22563}"/>
+              </a:ext>
+            </a:extLst>
+          </p:cNvPr>
+          <p:cNvSpPr txBox="1"/>
+          <p:nvPr/>
+        </p:nvSpPr>
+        <p:spPr>
+          <a:xfrm>
+            <a:off x="711200" y="4850531"/>
+            <a:ext cx="1076064" cy="461665"/>
+          </a:xfrm>
+          <a:prstGeom prst="rect">
+            <a:avLst/>
+          </a:prstGeom>
+          <a:noFill/>
+        </p:spPr>
+        <p:txBody>
+          <a:bodyPr wrap="none" rtlCol="0">
+            <a:spAutoFit/>
+          </a:bodyPr>
+          <a:lstStyle/>
+          <a:p>
+            <a:r>
+              <a:rPr lang="de-DE" sz="2400" dirty="0"/>
+              <a:t>1 </a:t>
+            </a:r>
+            <a:r>
+              <a:rPr lang="de-DE" sz="2400" dirty="0" err="1"/>
+              <a:t>Voxel</a:t>
+            </a:r>
+            <a:endParaRPr lang="de-DE" sz="2400" dirty="0"/>
+          </a:p>
+        </p:txBody>
+      </p:sp>
+      <p:sp>
+        <p:nvSpPr>
+          <p:cNvPr id="91" name="TextBox 90">
+            <a:extLst>
+              <a:ext uri="{FF2B5EF4-FFF2-40B4-BE49-F238E27FC236}">
+                <a16:creationId xmlns:a16="http://schemas.microsoft.com/office/drawing/2014/main" id="{F14A24B4-11F2-7B4D-98DE-425644A65EAC}"/>
+              </a:ext>
+            </a:extLst>
+          </p:cNvPr>
+          <p:cNvSpPr txBox="1"/>
+          <p:nvPr/>
+        </p:nvSpPr>
+        <p:spPr>
+          <a:xfrm>
+            <a:off x="3767921" y="6107188"/>
+            <a:ext cx="2027158" cy="461665"/>
+          </a:xfrm>
+          <a:prstGeom prst="rect">
+            <a:avLst/>
+          </a:prstGeom>
+          <a:noFill/>
+        </p:spPr>
+        <p:txBody>
+          <a:bodyPr wrap="none" rtlCol="0">
+            <a:spAutoFit/>
+          </a:bodyPr>
+          <a:lstStyle/>
+          <a:p>
+            <a:r>
+              <a:rPr lang="de-DE" sz="2400" dirty="0"/>
+              <a:t>6-connectivity</a:t>
+            </a:r>
+          </a:p>
+        </p:txBody>
+      </p:sp>
+      <p:sp>
+        <p:nvSpPr>
+          <p:cNvPr id="92" name="TextBox 91">
+            <a:extLst>
+              <a:ext uri="{FF2B5EF4-FFF2-40B4-BE49-F238E27FC236}">
+                <a16:creationId xmlns:a16="http://schemas.microsoft.com/office/drawing/2014/main" id="{232F84A2-7486-AA4C-B529-A6DF3E42B53A}"/>
+              </a:ext>
+            </a:extLst>
+          </p:cNvPr>
+          <p:cNvSpPr txBox="1"/>
+          <p:nvPr/>
+        </p:nvSpPr>
+        <p:spPr>
+          <a:xfrm>
+            <a:off x="8064353" y="6107188"/>
+            <a:ext cx="2112117" cy="461665"/>
+          </a:xfrm>
+          <a:prstGeom prst="rect">
+            <a:avLst/>
+          </a:prstGeom>
+          <a:noFill/>
+        </p:spPr>
+        <p:txBody>
+          <a:bodyPr wrap="none" rtlCol="0">
+            <a:spAutoFit/>
+          </a:bodyPr>
+          <a:lstStyle/>
+          <a:p>
+            <a:r>
+              <a:rPr lang="de-DE" sz="2400" dirty="0"/>
+              <a:t>26-connectivity</a:t>
+            </a:r>
+          </a:p>
+        </p:txBody>
+      </p:sp>
+      <p:sp>
+        <p:nvSpPr>
+          <p:cNvPr id="44" name="Google Shape;204;p24"/>
+          <p:cNvSpPr txBox="1">
+            <a:spLocks/>
+          </p:cNvSpPr>
+          <p:nvPr/>
+        </p:nvSpPr>
+        <p:spPr>
+          <a:xfrm>
+            <a:off x="1633045" y="689479"/>
+            <a:ext cx="9205650" cy="763650"/>
+          </a:xfrm>
+          <a:prstGeom prst="rect">
+            <a:avLst/>
+          </a:prstGeom>
+          <a:noFill/>
+          <a:ln>
+            <a:noFill/>
+          </a:ln>
+        </p:spPr>
+        <p:txBody>
+          <a:bodyPr spcFirstLastPara="1" vert="horz" wrap="square" lIns="121888" tIns="121888" rIns="121888" bIns="121888" rtlCol="0" anchor="t" anchorCtr="0">
+            <a:noAutofit/>
+          </a:bodyPr>
+          <a:lstStyle>
+            <a:lvl1pPr algn="l" defTabSz="914400" rtl="0" eaLnBrk="1" latinLnBrk="0" hangingPunct="1">
+              <a:lnSpc>
+                <a:spcPct val="90000"/>
+              </a:lnSpc>
+              <a:spcBef>
+                <a:spcPct val="0"/>
+              </a:spcBef>
+              <a:buNone/>
+              <a:defRPr sz="4400" kern="1200">
+                <a:solidFill>
+                  <a:schemeClr val="tx1"/>
+                </a:solidFill>
+                <a:latin typeface="+mj-lt"/>
+                <a:ea typeface="+mj-ea"/>
+                <a:cs typeface="+mj-cs"/>
+              </a:defRPr>
+            </a:lvl1pPr>
+          </a:lstStyle>
+          <a:p>
+            <a:pPr algn="ctr">
+              <a:buSzPts val="5800"/>
+            </a:pPr>
+            <a:r>
+              <a:rPr lang="en-US" sz="3600" dirty="0" smtClean="0">
+                <a:solidFill>
+                  <a:srgbClr val="93C47D"/>
+                </a:solidFill>
+              </a:rPr>
+              <a:t>Connectivity in 3D</a:t>
+            </a:r>
+            <a:endParaRPr lang="en-US" sz="3600" dirty="0">
+              <a:solidFill>
+                <a:srgbClr val="93C47D"/>
+              </a:solidFill>
+            </a:endParaRPr>
+          </a:p>
+        </p:txBody>
+      </p:sp>
+    </p:spTree>
+    <p:extLst>
+      <p:ext uri="{BB962C8B-B14F-4D97-AF65-F5344CB8AC3E}">
+        <p14:creationId xmlns:p14="http://schemas.microsoft.com/office/powerpoint/2010/main" val="2013681128"/>
       </p:ext>
     </p:extLst>
   </p:cSld>

</xml_diff>